<commit_message>
Flow_McKenzie.xml - Add FLOW McKenzie Ditch analysis" report. Reach_McKenzie.dbf - Add attributes Q_MIN and IN_RUNOFF. Flow.cpp, .h - Add Reach attributes Q_MIN and IN_RUNOFF. Adjust the NominalLowFlow_cms() algorithm to lower the nominal low flows everywhere except in the headwater reaches.  This reduces the amount of magic water that the model adds to keep the little streams from going dry. Add logic to populate Reach layer attributes WIDTH_MIN, DEPTH_MIN, and Q_MIN.
</commit_message>
<xml_diff>
--- a/DataCW3M/CW3MdigitalHandbook/McKenzieGages.pptx
+++ b/DataCW3M/CW3MdigitalHandbook/McKenzieGages.pptx
@@ -7,6 +7,7 @@
   <p:sldIdLst>
     <p:sldId id="256" r:id="rId2"/>
     <p:sldId id="257" r:id="rId3"/>
+    <p:sldId id="258" r:id="rId4"/>
   </p:sldIdLst>
   <p:sldSz cx="12192000" cy="6858000"/>
   <p:notesSz cx="7099300" cy="9385300"/>
@@ -105,6 +106,11 @@
       </a:defRPr>
     </a:lvl9pPr>
   </p:defaultTextStyle>
+  <p:extLst>
+    <p:ext uri="{EFAFB233-063F-42B5-8137-9DF3F51BA10A}">
+      <p15:sldGuideLst xmlns:p15="http://schemas.microsoft.com/office/powerpoint/2012/main"/>
+    </p:ext>
+  </p:extLst>
 </p:presentation>
 </file>
 
@@ -255,7 +261,7 @@
           <a:p>
             <a:fld id="{A1271B54-4FE3-4F00-A9A1-C0715B607BDA}" type="datetimeFigureOut">
               <a:rPr lang="en-US" smtClean="0"/>
-              <a:t>10/30/2020</a:t>
+              <a:t>11/13/2020</a:t>
             </a:fld>
             <a:endParaRPr lang="en-US"/>
           </a:p>
@@ -453,7 +459,7 @@
           <a:p>
             <a:fld id="{A1271B54-4FE3-4F00-A9A1-C0715B607BDA}" type="datetimeFigureOut">
               <a:rPr lang="en-US" smtClean="0"/>
-              <a:t>10/30/2020</a:t>
+              <a:t>11/13/2020</a:t>
             </a:fld>
             <a:endParaRPr lang="en-US"/>
           </a:p>
@@ -661,7 +667,7 @@
           <a:p>
             <a:fld id="{A1271B54-4FE3-4F00-A9A1-C0715B607BDA}" type="datetimeFigureOut">
               <a:rPr lang="en-US" smtClean="0"/>
-              <a:t>10/30/2020</a:t>
+              <a:t>11/13/2020</a:t>
             </a:fld>
             <a:endParaRPr lang="en-US"/>
           </a:p>
@@ -859,7 +865,7 @@
           <a:p>
             <a:fld id="{A1271B54-4FE3-4F00-A9A1-C0715B607BDA}" type="datetimeFigureOut">
               <a:rPr lang="en-US" smtClean="0"/>
-              <a:t>10/30/2020</a:t>
+              <a:t>11/13/2020</a:t>
             </a:fld>
             <a:endParaRPr lang="en-US"/>
           </a:p>
@@ -1134,7 +1140,7 @@
           <a:p>
             <a:fld id="{A1271B54-4FE3-4F00-A9A1-C0715B607BDA}" type="datetimeFigureOut">
               <a:rPr lang="en-US" smtClean="0"/>
-              <a:t>10/30/2020</a:t>
+              <a:t>11/13/2020</a:t>
             </a:fld>
             <a:endParaRPr lang="en-US"/>
           </a:p>
@@ -1399,7 +1405,7 @@
           <a:p>
             <a:fld id="{A1271B54-4FE3-4F00-A9A1-C0715B607BDA}" type="datetimeFigureOut">
               <a:rPr lang="en-US" smtClean="0"/>
-              <a:t>10/30/2020</a:t>
+              <a:t>11/13/2020</a:t>
             </a:fld>
             <a:endParaRPr lang="en-US"/>
           </a:p>
@@ -1811,7 +1817,7 @@
           <a:p>
             <a:fld id="{A1271B54-4FE3-4F00-A9A1-C0715B607BDA}" type="datetimeFigureOut">
               <a:rPr lang="en-US" smtClean="0"/>
-              <a:t>10/30/2020</a:t>
+              <a:t>11/13/2020</a:t>
             </a:fld>
             <a:endParaRPr lang="en-US"/>
           </a:p>
@@ -1952,7 +1958,7 @@
           <a:p>
             <a:fld id="{A1271B54-4FE3-4F00-A9A1-C0715B607BDA}" type="datetimeFigureOut">
               <a:rPr lang="en-US" smtClean="0"/>
-              <a:t>10/30/2020</a:t>
+              <a:t>11/13/2020</a:t>
             </a:fld>
             <a:endParaRPr lang="en-US"/>
           </a:p>
@@ -2065,7 +2071,7 @@
           <a:p>
             <a:fld id="{A1271B54-4FE3-4F00-A9A1-C0715B607BDA}" type="datetimeFigureOut">
               <a:rPr lang="en-US" smtClean="0"/>
-              <a:t>10/30/2020</a:t>
+              <a:t>11/13/2020</a:t>
             </a:fld>
             <a:endParaRPr lang="en-US"/>
           </a:p>
@@ -2376,7 +2382,7 @@
           <a:p>
             <a:fld id="{A1271B54-4FE3-4F00-A9A1-C0715B607BDA}" type="datetimeFigureOut">
               <a:rPr lang="en-US" smtClean="0"/>
-              <a:t>10/30/2020</a:t>
+              <a:t>11/13/2020</a:t>
             </a:fld>
             <a:endParaRPr lang="en-US"/>
           </a:p>
@@ -2664,7 +2670,7 @@
           <a:p>
             <a:fld id="{A1271B54-4FE3-4F00-A9A1-C0715B607BDA}" type="datetimeFigureOut">
               <a:rPr lang="en-US" smtClean="0"/>
-              <a:t>10/30/2020</a:t>
+              <a:t>11/13/2020</a:t>
             </a:fld>
             <a:endParaRPr lang="en-US"/>
           </a:p>
@@ -2905,7 +2911,7 @@
           <a:p>
             <a:fld id="{A1271B54-4FE3-4F00-A9A1-C0715B607BDA}" type="datetimeFigureOut">
               <a:rPr lang="en-US" smtClean="0"/>
-              <a:t>10/30/2020</a:t>
+              <a:t>11/13/2020</a:t>
             </a:fld>
             <a:endParaRPr lang="en-US"/>
           </a:p>
@@ -4572,6 +4578,226 @@
 </p:sld>
 </file>
 
+<file path=ppt/slides/slide3.xml><?xml version="1.0" encoding="utf-8"?>
+<p:sld xmlns:a="http://schemas.openxmlformats.org/drawingml/2006/main" xmlns:r="http://schemas.openxmlformats.org/officeDocument/2006/relationships" xmlns:p="http://schemas.openxmlformats.org/presentationml/2006/main">
+  <p:cSld>
+    <p:spTree>
+      <p:nvGrpSpPr>
+        <p:cNvPr id="1" name=""/>
+        <p:cNvGrpSpPr/>
+        <p:nvPr/>
+      </p:nvGrpSpPr>
+      <p:grpSpPr>
+        <a:xfrm>
+          <a:off x="0" y="0"/>
+          <a:ext cx="0" cy="0"/>
+          <a:chOff x="0" y="0"/>
+          <a:chExt cx="0" cy="0"/>
+        </a:xfrm>
+      </p:grpSpPr>
+      <p:pic>
+        <p:nvPicPr>
+          <p:cNvPr id="2" name="Picture 1">
+            <a:extLst>
+              <a:ext uri="{FF2B5EF4-FFF2-40B4-BE49-F238E27FC236}">
+                <a16:creationId xmlns:a16="http://schemas.microsoft.com/office/drawing/2014/main" id="{2BE6F3D0-5238-4505-83C8-1A8296A35489}"/>
+              </a:ext>
+            </a:extLst>
+          </p:cNvPr>
+          <p:cNvPicPr>
+            <a:picLocks noChangeAspect="1"/>
+          </p:cNvPicPr>
+          <p:nvPr/>
+        </p:nvPicPr>
+        <p:blipFill>
+          <a:blip r:embed="rId2"/>
+          <a:stretch>
+            <a:fillRect/>
+          </a:stretch>
+        </p:blipFill>
+        <p:spPr>
+          <a:xfrm>
+            <a:off x="82643" y="217114"/>
+            <a:ext cx="6578133" cy="3564097"/>
+          </a:xfrm>
+          <a:prstGeom prst="rect">
+            <a:avLst/>
+          </a:prstGeom>
+        </p:spPr>
+      </p:pic>
+      <p:pic>
+        <p:nvPicPr>
+          <p:cNvPr id="3" name="Picture 2">
+            <a:extLst>
+              <a:ext uri="{FF2B5EF4-FFF2-40B4-BE49-F238E27FC236}">
+                <a16:creationId xmlns:a16="http://schemas.microsoft.com/office/drawing/2014/main" id="{B323E1AB-EACA-4171-9702-EEE7F1CC9D0E}"/>
+              </a:ext>
+            </a:extLst>
+          </p:cNvPr>
+          <p:cNvPicPr>
+            <a:picLocks noChangeAspect="1"/>
+          </p:cNvPicPr>
+          <p:nvPr/>
+        </p:nvPicPr>
+        <p:blipFill>
+          <a:blip r:embed="rId3"/>
+          <a:stretch>
+            <a:fillRect/>
+          </a:stretch>
+        </p:blipFill>
+        <p:spPr>
+          <a:xfrm>
+            <a:off x="5526612" y="3293903"/>
+            <a:ext cx="6582745" cy="3564097"/>
+          </a:xfrm>
+          <a:prstGeom prst="rect">
+            <a:avLst/>
+          </a:prstGeom>
+        </p:spPr>
+      </p:pic>
+      <p:sp>
+        <p:nvSpPr>
+          <p:cNvPr id="4" name="TextBox 3">
+            <a:extLst>
+              <a:ext uri="{FF2B5EF4-FFF2-40B4-BE49-F238E27FC236}">
+                <a16:creationId xmlns:a16="http://schemas.microsoft.com/office/drawing/2014/main" id="{79A8368A-22DC-4B66-9E03-52F336FEEB6A}"/>
+              </a:ext>
+            </a:extLst>
+          </p:cNvPr>
+          <p:cNvSpPr txBox="1"/>
+          <p:nvPr/>
+        </p:nvSpPr>
+        <p:spPr>
+          <a:xfrm>
+            <a:off x="0" y="3781211"/>
+            <a:ext cx="2247410" cy="1754326"/>
+          </a:xfrm>
+          <a:prstGeom prst="rect">
+            <a:avLst/>
+          </a:prstGeom>
+          <a:noFill/>
+        </p:spPr>
+        <p:txBody>
+          <a:bodyPr wrap="none" rtlCol="0">
+            <a:spAutoFit/>
+          </a:bodyPr>
+          <a:lstStyle/>
+          <a:p>
+            <a:r>
+              <a:rPr lang="en-US" dirty="0"/>
+              <a:t>Lookout Cr. gage with </a:t>
+            </a:r>
+          </a:p>
+          <a:p>
+            <a:r>
+              <a:rPr lang="en-US" dirty="0"/>
+              <a:t>0.36 cms spring water</a:t>
+            </a:r>
+          </a:p>
+          <a:p>
+            <a:r>
+              <a:rPr lang="en-US" dirty="0"/>
+              <a:t>NSE 0.84 VG</a:t>
+            </a:r>
+          </a:p>
+          <a:p>
+            <a:r>
+              <a:rPr lang="en-US" dirty="0"/>
+              <a:t>%BIAS -1.7% VG</a:t>
+            </a:r>
+          </a:p>
+          <a:p>
+            <a:r>
+              <a:rPr lang="en-US" dirty="0"/>
+              <a:t>RSR 0.40 VG</a:t>
+            </a:r>
+          </a:p>
+          <a:p>
+            <a:r>
+              <a:rPr lang="en-US" dirty="0"/>
+              <a:t>R2 0.84 G</a:t>
+            </a:r>
+          </a:p>
+        </p:txBody>
+      </p:sp>
+      <p:sp>
+        <p:nvSpPr>
+          <p:cNvPr id="6" name="TextBox 5">
+            <a:extLst>
+              <a:ext uri="{FF2B5EF4-FFF2-40B4-BE49-F238E27FC236}">
+                <a16:creationId xmlns:a16="http://schemas.microsoft.com/office/drawing/2014/main" id="{7732A5CA-C51B-42DB-A0E7-712644A5BA6F}"/>
+              </a:ext>
+            </a:extLst>
+          </p:cNvPr>
+          <p:cNvSpPr txBox="1"/>
+          <p:nvPr/>
+        </p:nvSpPr>
+        <p:spPr>
+          <a:xfrm>
+            <a:off x="9884960" y="1539577"/>
+            <a:ext cx="2240550" cy="1754326"/>
+          </a:xfrm>
+          <a:prstGeom prst="rect">
+            <a:avLst/>
+          </a:prstGeom>
+          <a:noFill/>
+        </p:spPr>
+        <p:txBody>
+          <a:bodyPr wrap="none" rtlCol="0">
+            <a:spAutoFit/>
+          </a:bodyPr>
+          <a:lstStyle/>
+          <a:p>
+            <a:r>
+              <a:rPr lang="en-US" dirty="0"/>
+              <a:t>Clear Lake gage with </a:t>
+            </a:r>
+          </a:p>
+          <a:p>
+            <a:r>
+              <a:rPr lang="en-US" dirty="0"/>
+              <a:t>8.52 cms spring water</a:t>
+            </a:r>
+          </a:p>
+          <a:p>
+            <a:r>
+              <a:rPr lang="en-US" dirty="0"/>
+              <a:t>NSE 0.43 NS</a:t>
+            </a:r>
+          </a:p>
+          <a:p>
+            <a:r>
+              <a:rPr lang="en-US" dirty="0"/>
+              <a:t>%BIAS 0.0% VG</a:t>
+            </a:r>
+          </a:p>
+          <a:p>
+            <a:r>
+              <a:rPr lang="en-US" dirty="0"/>
+              <a:t>RSR 0.76 NS</a:t>
+            </a:r>
+          </a:p>
+          <a:p>
+            <a:r>
+              <a:rPr lang="en-US" dirty="0"/>
+              <a:t>R2 0.43 NS</a:t>
+            </a:r>
+          </a:p>
+        </p:txBody>
+      </p:sp>
+    </p:spTree>
+    <p:extLst>
+      <p:ext uri="{BB962C8B-B14F-4D97-AF65-F5344CB8AC3E}">
+        <p14:creationId xmlns:p14="http://schemas.microsoft.com/office/powerpoint/2010/main" val="2976461848"/>
+      </p:ext>
+    </p:extLst>
+  </p:cSld>
+  <p:clrMapOvr>
+    <a:masterClrMapping/>
+  </p:clrMapOvr>
+</p:sld>
+</file>
+
 <file path=ppt/theme/theme1.xml><?xml version="1.0" encoding="utf-8"?>
 <a:theme xmlns:a="http://schemas.openxmlformats.org/drawingml/2006/main" name="Office Theme">
   <a:themeElements>

</xml_diff>

<commit_message>
Flow_McKenzie.xml - Roll back a change made prematurely in a previous revision. ReachRouting.cpp - Correct a bug in the new cloudiness calculation.
</commit_message>
<xml_diff>
--- a/DataCW3M/CW3MdigitalHandbook/McKenzieGages.pptx
+++ b/DataCW3M/CW3MdigitalHandbook/McKenzieGages.pptx
@@ -9,6 +9,7 @@
     <p:sldId id="257" r:id="rId3"/>
     <p:sldId id="258" r:id="rId4"/>
     <p:sldId id="259" r:id="rId5"/>
+    <p:sldId id="260" r:id="rId6"/>
   </p:sldIdLst>
   <p:sldSz cx="12192000" cy="6858000"/>
   <p:notesSz cx="7099300" cy="9385300"/>
@@ -262,7 +263,7 @@
           <a:p>
             <a:fld id="{A1271B54-4FE3-4F00-A9A1-C0715B607BDA}" type="datetimeFigureOut">
               <a:rPr lang="en-US" smtClean="0"/>
-              <a:t>11/17/2020</a:t>
+              <a:t>11/25/2020</a:t>
             </a:fld>
             <a:endParaRPr lang="en-US"/>
           </a:p>
@@ -460,7 +461,7 @@
           <a:p>
             <a:fld id="{A1271B54-4FE3-4F00-A9A1-C0715B607BDA}" type="datetimeFigureOut">
               <a:rPr lang="en-US" smtClean="0"/>
-              <a:t>11/17/2020</a:t>
+              <a:t>11/25/2020</a:t>
             </a:fld>
             <a:endParaRPr lang="en-US"/>
           </a:p>
@@ -668,7 +669,7 @@
           <a:p>
             <a:fld id="{A1271B54-4FE3-4F00-A9A1-C0715B607BDA}" type="datetimeFigureOut">
               <a:rPr lang="en-US" smtClean="0"/>
-              <a:t>11/17/2020</a:t>
+              <a:t>11/25/2020</a:t>
             </a:fld>
             <a:endParaRPr lang="en-US"/>
           </a:p>
@@ -866,7 +867,7 @@
           <a:p>
             <a:fld id="{A1271B54-4FE3-4F00-A9A1-C0715B607BDA}" type="datetimeFigureOut">
               <a:rPr lang="en-US" smtClean="0"/>
-              <a:t>11/17/2020</a:t>
+              <a:t>11/25/2020</a:t>
             </a:fld>
             <a:endParaRPr lang="en-US"/>
           </a:p>
@@ -1141,7 +1142,7 @@
           <a:p>
             <a:fld id="{A1271B54-4FE3-4F00-A9A1-C0715B607BDA}" type="datetimeFigureOut">
               <a:rPr lang="en-US" smtClean="0"/>
-              <a:t>11/17/2020</a:t>
+              <a:t>11/25/2020</a:t>
             </a:fld>
             <a:endParaRPr lang="en-US"/>
           </a:p>
@@ -1406,7 +1407,7 @@
           <a:p>
             <a:fld id="{A1271B54-4FE3-4F00-A9A1-C0715B607BDA}" type="datetimeFigureOut">
               <a:rPr lang="en-US" smtClean="0"/>
-              <a:t>11/17/2020</a:t>
+              <a:t>11/25/2020</a:t>
             </a:fld>
             <a:endParaRPr lang="en-US"/>
           </a:p>
@@ -1818,7 +1819,7 @@
           <a:p>
             <a:fld id="{A1271B54-4FE3-4F00-A9A1-C0715B607BDA}" type="datetimeFigureOut">
               <a:rPr lang="en-US" smtClean="0"/>
-              <a:t>11/17/2020</a:t>
+              <a:t>11/25/2020</a:t>
             </a:fld>
             <a:endParaRPr lang="en-US"/>
           </a:p>
@@ -1959,7 +1960,7 @@
           <a:p>
             <a:fld id="{A1271B54-4FE3-4F00-A9A1-C0715B607BDA}" type="datetimeFigureOut">
               <a:rPr lang="en-US" smtClean="0"/>
-              <a:t>11/17/2020</a:t>
+              <a:t>11/25/2020</a:t>
             </a:fld>
             <a:endParaRPr lang="en-US"/>
           </a:p>
@@ -2072,7 +2073,7 @@
           <a:p>
             <a:fld id="{A1271B54-4FE3-4F00-A9A1-C0715B607BDA}" type="datetimeFigureOut">
               <a:rPr lang="en-US" smtClean="0"/>
-              <a:t>11/17/2020</a:t>
+              <a:t>11/25/2020</a:t>
             </a:fld>
             <a:endParaRPr lang="en-US"/>
           </a:p>
@@ -2383,7 +2384,7 @@
           <a:p>
             <a:fld id="{A1271B54-4FE3-4F00-A9A1-C0715B607BDA}" type="datetimeFigureOut">
               <a:rPr lang="en-US" smtClean="0"/>
-              <a:t>11/17/2020</a:t>
+              <a:t>11/25/2020</a:t>
             </a:fld>
             <a:endParaRPr lang="en-US"/>
           </a:p>
@@ -2671,7 +2672,7 @@
           <a:p>
             <a:fld id="{A1271B54-4FE3-4F00-A9A1-C0715B607BDA}" type="datetimeFigureOut">
               <a:rPr lang="en-US" smtClean="0"/>
-              <a:t>11/17/2020</a:t>
+              <a:t>11/25/2020</a:t>
             </a:fld>
             <a:endParaRPr lang="en-US"/>
           </a:p>
@@ -2912,7 +2913,7 @@
           <a:p>
             <a:fld id="{A1271B54-4FE3-4F00-A9A1-C0715B607BDA}" type="datetimeFigureOut">
               <a:rPr lang="en-US" smtClean="0"/>
-              <a:t>11/17/2020</a:t>
+              <a:t>11/25/2020</a:t>
             </a:fld>
             <a:endParaRPr lang="en-US"/>
           </a:p>
@@ -4889,6 +4890,96 @@
 </p:sld>
 </file>
 
+<file path=ppt/slides/slide5.xml><?xml version="1.0" encoding="utf-8"?>
+<p:sld xmlns:a="http://schemas.openxmlformats.org/drawingml/2006/main" xmlns:r="http://schemas.openxmlformats.org/officeDocument/2006/relationships" xmlns:p="http://schemas.openxmlformats.org/presentationml/2006/main">
+  <p:cSld>
+    <p:spTree>
+      <p:nvGrpSpPr>
+        <p:cNvPr id="1" name=""/>
+        <p:cNvGrpSpPr/>
+        <p:nvPr/>
+      </p:nvGrpSpPr>
+      <p:grpSpPr>
+        <a:xfrm>
+          <a:off x="0" y="0"/>
+          <a:ext cx="0" cy="0"/>
+          <a:chOff x="0" y="0"/>
+          <a:chExt cx="0" cy="0"/>
+        </a:xfrm>
+      </p:grpSpPr>
+      <p:pic>
+        <p:nvPicPr>
+          <p:cNvPr id="2" name="Picture 1">
+            <a:extLst>
+              <a:ext uri="{FF2B5EF4-FFF2-40B4-BE49-F238E27FC236}">
+                <a16:creationId xmlns:a16="http://schemas.microsoft.com/office/drawing/2014/main" id="{2D687401-A1E7-4B49-8420-0AEE1B74E104}"/>
+              </a:ext>
+            </a:extLst>
+          </p:cNvPr>
+          <p:cNvPicPr>
+            <a:picLocks noChangeAspect="1"/>
+          </p:cNvPicPr>
+          <p:nvPr/>
+        </p:nvPicPr>
+        <p:blipFill>
+          <a:blip r:embed="rId2"/>
+          <a:stretch>
+            <a:fillRect/>
+          </a:stretch>
+        </p:blipFill>
+        <p:spPr>
+          <a:xfrm>
+            <a:off x="6015318" y="3067568"/>
+            <a:ext cx="6176682" cy="3790432"/>
+          </a:xfrm>
+          <a:prstGeom prst="rect">
+            <a:avLst/>
+          </a:prstGeom>
+        </p:spPr>
+      </p:pic>
+      <p:pic>
+        <p:nvPicPr>
+          <p:cNvPr id="3" name="Picture 2">
+            <a:extLst>
+              <a:ext uri="{FF2B5EF4-FFF2-40B4-BE49-F238E27FC236}">
+                <a16:creationId xmlns:a16="http://schemas.microsoft.com/office/drawing/2014/main" id="{922C411E-F082-4389-841B-BDD950092346}"/>
+              </a:ext>
+            </a:extLst>
+          </p:cNvPr>
+          <p:cNvPicPr>
+            <a:picLocks noChangeAspect="1"/>
+          </p:cNvPicPr>
+          <p:nvPr/>
+        </p:nvPicPr>
+        <p:blipFill>
+          <a:blip r:embed="rId3"/>
+          <a:stretch>
+            <a:fillRect/>
+          </a:stretch>
+        </p:blipFill>
+        <p:spPr>
+          <a:xfrm>
+            <a:off x="0" y="0"/>
+            <a:ext cx="6176682" cy="3793005"/>
+          </a:xfrm>
+          <a:prstGeom prst="rect">
+            <a:avLst/>
+          </a:prstGeom>
+        </p:spPr>
+      </p:pic>
+    </p:spTree>
+    <p:extLst>
+      <p:ext uri="{BB962C8B-B14F-4D97-AF65-F5344CB8AC3E}">
+        <p14:creationId xmlns:p14="http://schemas.microsoft.com/office/powerpoint/2010/main" val="2050340435"/>
+      </p:ext>
+    </p:extLst>
+  </p:cSld>
+  <p:clrMapOvr>
+    <a:masterClrMapping/>
+  </p:clrMapOvr>
+</p:sld>
+</file>
+
 <file path=ppt/theme/theme1.xml><?xml version="1.0" encoding="utf-8"?>
 <a:theme xmlns:a="http://schemas.openxmlformats.org/drawingml/2006/main" name="Office Theme">
   <a:themeElements>

</xml_diff>

<commit_message>
Flow.cpp - Roll back a change made in version 97 to the temperature of water released from reservoirs. Setting the release water temperature to the temperature of the water in the stream flowing into the reservoir results in a spike in release temperatures in the late summer which is not present in the observational data.
</commit_message>
<xml_diff>
--- a/DataCW3M/CW3MdigitalHandbook/McKenzieGages.pptx
+++ b/DataCW3M/CW3MdigitalHandbook/McKenzieGages.pptx
@@ -263,7 +263,7 @@
           <a:p>
             <a:fld id="{A1271B54-4FE3-4F00-A9A1-C0715B607BDA}" type="datetimeFigureOut">
               <a:rPr lang="en-US" smtClean="0"/>
-              <a:t>11/25/2020</a:t>
+              <a:t>11/26/2020</a:t>
             </a:fld>
             <a:endParaRPr lang="en-US"/>
           </a:p>
@@ -461,7 +461,7 @@
           <a:p>
             <a:fld id="{A1271B54-4FE3-4F00-A9A1-C0715B607BDA}" type="datetimeFigureOut">
               <a:rPr lang="en-US" smtClean="0"/>
-              <a:t>11/25/2020</a:t>
+              <a:t>11/26/2020</a:t>
             </a:fld>
             <a:endParaRPr lang="en-US"/>
           </a:p>
@@ -669,7 +669,7 @@
           <a:p>
             <a:fld id="{A1271B54-4FE3-4F00-A9A1-C0715B607BDA}" type="datetimeFigureOut">
               <a:rPr lang="en-US" smtClean="0"/>
-              <a:t>11/25/2020</a:t>
+              <a:t>11/26/2020</a:t>
             </a:fld>
             <a:endParaRPr lang="en-US"/>
           </a:p>
@@ -867,7 +867,7 @@
           <a:p>
             <a:fld id="{A1271B54-4FE3-4F00-A9A1-C0715B607BDA}" type="datetimeFigureOut">
               <a:rPr lang="en-US" smtClean="0"/>
-              <a:t>11/25/2020</a:t>
+              <a:t>11/26/2020</a:t>
             </a:fld>
             <a:endParaRPr lang="en-US"/>
           </a:p>
@@ -1142,7 +1142,7 @@
           <a:p>
             <a:fld id="{A1271B54-4FE3-4F00-A9A1-C0715B607BDA}" type="datetimeFigureOut">
               <a:rPr lang="en-US" smtClean="0"/>
-              <a:t>11/25/2020</a:t>
+              <a:t>11/26/2020</a:t>
             </a:fld>
             <a:endParaRPr lang="en-US"/>
           </a:p>
@@ -1407,7 +1407,7 @@
           <a:p>
             <a:fld id="{A1271B54-4FE3-4F00-A9A1-C0715B607BDA}" type="datetimeFigureOut">
               <a:rPr lang="en-US" smtClean="0"/>
-              <a:t>11/25/2020</a:t>
+              <a:t>11/26/2020</a:t>
             </a:fld>
             <a:endParaRPr lang="en-US"/>
           </a:p>
@@ -1819,7 +1819,7 @@
           <a:p>
             <a:fld id="{A1271B54-4FE3-4F00-A9A1-C0715B607BDA}" type="datetimeFigureOut">
               <a:rPr lang="en-US" smtClean="0"/>
-              <a:t>11/25/2020</a:t>
+              <a:t>11/26/2020</a:t>
             </a:fld>
             <a:endParaRPr lang="en-US"/>
           </a:p>
@@ -1960,7 +1960,7 @@
           <a:p>
             <a:fld id="{A1271B54-4FE3-4F00-A9A1-C0715B607BDA}" type="datetimeFigureOut">
               <a:rPr lang="en-US" smtClean="0"/>
-              <a:t>11/25/2020</a:t>
+              <a:t>11/26/2020</a:t>
             </a:fld>
             <a:endParaRPr lang="en-US"/>
           </a:p>
@@ -2073,7 +2073,7 @@
           <a:p>
             <a:fld id="{A1271B54-4FE3-4F00-A9A1-C0715B607BDA}" type="datetimeFigureOut">
               <a:rPr lang="en-US" smtClean="0"/>
-              <a:t>11/25/2020</a:t>
+              <a:t>11/26/2020</a:t>
             </a:fld>
             <a:endParaRPr lang="en-US"/>
           </a:p>
@@ -2384,7 +2384,7 @@
           <a:p>
             <a:fld id="{A1271B54-4FE3-4F00-A9A1-C0715B607BDA}" type="datetimeFigureOut">
               <a:rPr lang="en-US" smtClean="0"/>
-              <a:t>11/25/2020</a:t>
+              <a:t>11/26/2020</a:t>
             </a:fld>
             <a:endParaRPr lang="en-US"/>
           </a:p>
@@ -2672,7 +2672,7 @@
           <a:p>
             <a:fld id="{A1271B54-4FE3-4F00-A9A1-C0715B607BDA}" type="datetimeFigureOut">
               <a:rPr lang="en-US" smtClean="0"/>
-              <a:t>11/25/2020</a:t>
+              <a:t>11/26/2020</a:t>
             </a:fld>
             <a:endParaRPr lang="en-US"/>
           </a:p>
@@ -2913,7 +2913,7 @@
           <a:p>
             <a:fld id="{A1271B54-4FE3-4F00-A9A1-C0715B607BDA}" type="datetimeFigureOut">
               <a:rPr lang="en-US" smtClean="0"/>
-              <a:t>11/25/2020</a:t>
+              <a:t>11/26/2020</a:t>
             </a:fld>
             <a:endParaRPr lang="en-US"/>
           </a:p>
@@ -4909,10 +4909,10 @@
       </p:grpSpPr>
       <p:pic>
         <p:nvPicPr>
-          <p:cNvPr id="2" name="Picture 1">
-            <a:extLst>
-              <a:ext uri="{FF2B5EF4-FFF2-40B4-BE49-F238E27FC236}">
-                <a16:creationId xmlns:a16="http://schemas.microsoft.com/office/drawing/2014/main" id="{2D687401-A1E7-4B49-8420-0AEE1B74E104}"/>
+          <p:cNvPr id="7" name="Picture 6">
+            <a:extLst>
+              <a:ext uri="{FF2B5EF4-FFF2-40B4-BE49-F238E27FC236}">
+                <a16:creationId xmlns:a16="http://schemas.microsoft.com/office/drawing/2014/main" id="{43C73700-7271-4834-A780-06543E65CF03}"/>
               </a:ext>
             </a:extLst>
           </p:cNvPr>
@@ -4929,8 +4929,8 @@
         </p:blipFill>
         <p:spPr>
           <a:xfrm>
-            <a:off x="6015318" y="3067568"/>
-            <a:ext cx="6176682" cy="3790432"/>
+            <a:off x="6096000" y="0"/>
+            <a:ext cx="6095999" cy="3737076"/>
           </a:xfrm>
           <a:prstGeom prst="rect">
             <a:avLst/>
@@ -4939,10 +4939,10 @@
       </p:pic>
       <p:pic>
         <p:nvPicPr>
-          <p:cNvPr id="3" name="Picture 2">
-            <a:extLst>
-              <a:ext uri="{FF2B5EF4-FFF2-40B4-BE49-F238E27FC236}">
-                <a16:creationId xmlns:a16="http://schemas.microsoft.com/office/drawing/2014/main" id="{922C411E-F082-4389-841B-BDD950092346}"/>
+          <p:cNvPr id="6" name="Picture 5">
+            <a:extLst>
+              <a:ext uri="{FF2B5EF4-FFF2-40B4-BE49-F238E27FC236}">
+                <a16:creationId xmlns:a16="http://schemas.microsoft.com/office/drawing/2014/main" id="{9D4DC489-169E-4E67-BD54-45142987EAD6}"/>
               </a:ext>
             </a:extLst>
           </p:cNvPr>
@@ -4959,8 +4959,38 @@
         </p:blipFill>
         <p:spPr>
           <a:xfrm>
-            <a:off x="0" y="0"/>
-            <a:ext cx="6176682" cy="3793005"/>
+            <a:off x="5746376" y="2974046"/>
+            <a:ext cx="6346732" cy="3883953"/>
+          </a:xfrm>
+          <a:prstGeom prst="rect">
+            <a:avLst/>
+          </a:prstGeom>
+        </p:spPr>
+      </p:pic>
+      <p:pic>
+        <p:nvPicPr>
+          <p:cNvPr id="5" name="Picture 4">
+            <a:extLst>
+              <a:ext uri="{FF2B5EF4-FFF2-40B4-BE49-F238E27FC236}">
+                <a16:creationId xmlns:a16="http://schemas.microsoft.com/office/drawing/2014/main" id="{FD4E2427-992F-4DEC-8F3B-CF0B75E95770}"/>
+              </a:ext>
+            </a:extLst>
+          </p:cNvPr>
+          <p:cNvPicPr>
+            <a:picLocks noChangeAspect="1"/>
+          </p:cNvPicPr>
+          <p:nvPr/>
+        </p:nvPicPr>
+        <p:blipFill>
+          <a:blip r:embed="rId4"/>
+          <a:stretch>
+            <a:fillRect/>
+          </a:stretch>
+        </p:blipFill>
+        <p:spPr>
+          <a:xfrm>
+            <a:off x="1" y="0"/>
+            <a:ext cx="5943600" cy="3628985"/>
           </a:xfrm>
           <a:prstGeom prst="rect">
             <a:avLst/>
@@ -4970,7 +5000,7 @@
     </p:spTree>
     <p:extLst>
       <p:ext uri="{BB962C8B-B14F-4D97-AF65-F5344CB8AC3E}">
-        <p14:creationId xmlns:p14="http://schemas.microsoft.com/office/powerpoint/2010/main" val="2050340435"/>
+        <p14:creationId xmlns:p14="http://schemas.microsoft.com/office/powerpoint/2010/main" val="2507746178"/>
       </p:ext>
     </p:extLst>
   </p:cSld>

</xml_diff>

<commit_message>
Save updates to documentation.
</commit_message>
<xml_diff>
--- a/DataCW3M/CW3MdigitalHandbook/McKenzieGages.pptx
+++ b/DataCW3M/CW3MdigitalHandbook/McKenzieGages.pptx
@@ -10,6 +10,8 @@
     <p:sldId id="258" r:id="rId4"/>
     <p:sldId id="259" r:id="rId5"/>
     <p:sldId id="260" r:id="rId6"/>
+    <p:sldId id="262" r:id="rId7"/>
+    <p:sldId id="261" r:id="rId8"/>
   </p:sldIdLst>
   <p:sldSz cx="12192000" cy="6858000"/>
   <p:notesSz cx="7099300" cy="9385300"/>
@@ -4939,10 +4941,10 @@
       </p:pic>
       <p:pic>
         <p:nvPicPr>
-          <p:cNvPr id="6" name="Picture 5">
-            <a:extLst>
-              <a:ext uri="{FF2B5EF4-FFF2-40B4-BE49-F238E27FC236}">
-                <a16:creationId xmlns:a16="http://schemas.microsoft.com/office/drawing/2014/main" id="{9D4DC489-169E-4E67-BD54-45142987EAD6}"/>
+          <p:cNvPr id="5" name="Picture 4">
+            <a:extLst>
+              <a:ext uri="{FF2B5EF4-FFF2-40B4-BE49-F238E27FC236}">
+                <a16:creationId xmlns:a16="http://schemas.microsoft.com/office/drawing/2014/main" id="{FD4E2427-992F-4DEC-8F3B-CF0B75E95770}"/>
               </a:ext>
             </a:extLst>
           </p:cNvPr>
@@ -4959,8 +4961,8 @@
         </p:blipFill>
         <p:spPr>
           <a:xfrm>
-            <a:off x="5746376" y="2974046"/>
-            <a:ext cx="6346732" cy="3883953"/>
+            <a:off x="1" y="0"/>
+            <a:ext cx="5943600" cy="3628985"/>
           </a:xfrm>
           <a:prstGeom prst="rect">
             <a:avLst/>
@@ -4969,10 +4971,10 @@
       </p:pic>
       <p:pic>
         <p:nvPicPr>
-          <p:cNvPr id="5" name="Picture 4">
-            <a:extLst>
-              <a:ext uri="{FF2B5EF4-FFF2-40B4-BE49-F238E27FC236}">
-                <a16:creationId xmlns:a16="http://schemas.microsoft.com/office/drawing/2014/main" id="{FD4E2427-992F-4DEC-8F3B-CF0B75E95770}"/>
+          <p:cNvPr id="8" name="Picture 7">
+            <a:extLst>
+              <a:ext uri="{FF2B5EF4-FFF2-40B4-BE49-F238E27FC236}">
+                <a16:creationId xmlns:a16="http://schemas.microsoft.com/office/drawing/2014/main" id="{8EBF6D49-0D76-497A-A754-AF5BD2DA3CC6}"/>
               </a:ext>
             </a:extLst>
           </p:cNvPr>
@@ -4989,8 +4991,8 @@
         </p:blipFill>
         <p:spPr>
           <a:xfrm>
-            <a:off x="1" y="0"/>
-            <a:ext cx="5943600" cy="3628985"/>
+            <a:off x="3289766" y="2647950"/>
+            <a:ext cx="6867525" cy="4210050"/>
           </a:xfrm>
           <a:prstGeom prst="rect">
             <a:avLst/>
@@ -5001,6 +5003,186 @@
     <p:extLst>
       <p:ext uri="{BB962C8B-B14F-4D97-AF65-F5344CB8AC3E}">
         <p14:creationId xmlns:p14="http://schemas.microsoft.com/office/powerpoint/2010/main" val="2507746178"/>
+      </p:ext>
+    </p:extLst>
+  </p:cSld>
+  <p:clrMapOvr>
+    <a:masterClrMapping/>
+  </p:clrMapOvr>
+</p:sld>
+</file>
+
+<file path=ppt/slides/slide6.xml><?xml version="1.0" encoding="utf-8"?>
+<p:sld xmlns:a="http://schemas.openxmlformats.org/drawingml/2006/main" xmlns:r="http://schemas.openxmlformats.org/officeDocument/2006/relationships" xmlns:p="http://schemas.openxmlformats.org/presentationml/2006/main">
+  <p:cSld>
+    <p:spTree>
+      <p:nvGrpSpPr>
+        <p:cNvPr id="1" name=""/>
+        <p:cNvGrpSpPr/>
+        <p:nvPr/>
+      </p:nvGrpSpPr>
+      <p:grpSpPr>
+        <a:xfrm>
+          <a:off x="0" y="0"/>
+          <a:ext cx="0" cy="0"/>
+          <a:chOff x="0" y="0"/>
+          <a:chExt cx="0" cy="0"/>
+        </a:xfrm>
+      </p:grpSpPr>
+      <p:pic>
+        <p:nvPicPr>
+          <p:cNvPr id="2" name="Picture 1">
+            <a:extLst>
+              <a:ext uri="{FF2B5EF4-FFF2-40B4-BE49-F238E27FC236}">
+                <a16:creationId xmlns:a16="http://schemas.microsoft.com/office/drawing/2014/main" id="{AD392DC6-4300-4F18-8972-97B8B39B27A8}"/>
+              </a:ext>
+            </a:extLst>
+          </p:cNvPr>
+          <p:cNvPicPr>
+            <a:picLocks noChangeAspect="1"/>
+          </p:cNvPicPr>
+          <p:nvPr/>
+        </p:nvPicPr>
+        <p:blipFill>
+          <a:blip r:embed="rId2"/>
+          <a:stretch>
+            <a:fillRect/>
+          </a:stretch>
+        </p:blipFill>
+        <p:spPr>
+          <a:xfrm>
+            <a:off x="5324475" y="2546818"/>
+            <a:ext cx="6867525" cy="4210050"/>
+          </a:xfrm>
+          <a:prstGeom prst="rect">
+            <a:avLst/>
+          </a:prstGeom>
+        </p:spPr>
+      </p:pic>
+      <p:pic>
+        <p:nvPicPr>
+          <p:cNvPr id="3" name="Picture 2">
+            <a:extLst>
+              <a:ext uri="{FF2B5EF4-FFF2-40B4-BE49-F238E27FC236}">
+                <a16:creationId xmlns:a16="http://schemas.microsoft.com/office/drawing/2014/main" id="{1B01B9FB-AD51-440D-B048-1B1D5599AE94}"/>
+              </a:ext>
+            </a:extLst>
+          </p:cNvPr>
+          <p:cNvPicPr>
+            <a:picLocks noChangeAspect="1"/>
+          </p:cNvPicPr>
+          <p:nvPr/>
+        </p:nvPicPr>
+        <p:blipFill>
+          <a:blip r:embed="rId3"/>
+          <a:stretch>
+            <a:fillRect/>
+          </a:stretch>
+        </p:blipFill>
+        <p:spPr>
+          <a:xfrm>
+            <a:off x="0" y="101132"/>
+            <a:ext cx="6791325" cy="4181475"/>
+          </a:xfrm>
+          <a:prstGeom prst="rect">
+            <a:avLst/>
+          </a:prstGeom>
+        </p:spPr>
+      </p:pic>
+    </p:spTree>
+    <p:extLst>
+      <p:ext uri="{BB962C8B-B14F-4D97-AF65-F5344CB8AC3E}">
+        <p14:creationId xmlns:p14="http://schemas.microsoft.com/office/powerpoint/2010/main" val="1875313469"/>
+      </p:ext>
+    </p:extLst>
+  </p:cSld>
+  <p:clrMapOvr>
+    <a:masterClrMapping/>
+  </p:clrMapOvr>
+</p:sld>
+</file>
+
+<file path=ppt/slides/slide7.xml><?xml version="1.0" encoding="utf-8"?>
+<p:sld xmlns:a="http://schemas.openxmlformats.org/drawingml/2006/main" xmlns:r="http://schemas.openxmlformats.org/officeDocument/2006/relationships" xmlns:p="http://schemas.openxmlformats.org/presentationml/2006/main">
+  <p:cSld>
+    <p:spTree>
+      <p:nvGrpSpPr>
+        <p:cNvPr id="1" name=""/>
+        <p:cNvGrpSpPr/>
+        <p:nvPr/>
+      </p:nvGrpSpPr>
+      <p:grpSpPr>
+        <a:xfrm>
+          <a:off x="0" y="0"/>
+          <a:ext cx="0" cy="0"/>
+          <a:chOff x="0" y="0"/>
+          <a:chExt cx="0" cy="0"/>
+        </a:xfrm>
+      </p:grpSpPr>
+      <p:pic>
+        <p:nvPicPr>
+          <p:cNvPr id="3" name="Picture 2">
+            <a:extLst>
+              <a:ext uri="{FF2B5EF4-FFF2-40B4-BE49-F238E27FC236}">
+                <a16:creationId xmlns:a16="http://schemas.microsoft.com/office/drawing/2014/main" id="{A9E4E0B9-3431-4472-A4A2-E9081742CED9}"/>
+              </a:ext>
+            </a:extLst>
+          </p:cNvPr>
+          <p:cNvPicPr>
+            <a:picLocks noChangeAspect="1"/>
+          </p:cNvPicPr>
+          <p:nvPr/>
+        </p:nvPicPr>
+        <p:blipFill>
+          <a:blip r:embed="rId2"/>
+          <a:stretch>
+            <a:fillRect/>
+          </a:stretch>
+        </p:blipFill>
+        <p:spPr>
+          <a:xfrm>
+            <a:off x="0" y="3150664"/>
+            <a:ext cx="6221506" cy="3707336"/>
+          </a:xfrm>
+          <a:prstGeom prst="rect">
+            <a:avLst/>
+          </a:prstGeom>
+        </p:spPr>
+      </p:pic>
+      <p:pic>
+        <p:nvPicPr>
+          <p:cNvPr id="2" name="Picture 1">
+            <a:extLst>
+              <a:ext uri="{FF2B5EF4-FFF2-40B4-BE49-F238E27FC236}">
+                <a16:creationId xmlns:a16="http://schemas.microsoft.com/office/drawing/2014/main" id="{A7C5D9AD-5B76-430A-9CCB-E85CEDD04B88}"/>
+              </a:ext>
+            </a:extLst>
+          </p:cNvPr>
+          <p:cNvPicPr>
+            <a:picLocks noChangeAspect="1"/>
+          </p:cNvPicPr>
+          <p:nvPr/>
+        </p:nvPicPr>
+        <p:blipFill>
+          <a:blip r:embed="rId3"/>
+          <a:stretch>
+            <a:fillRect/>
+          </a:stretch>
+        </p:blipFill>
+        <p:spPr>
+          <a:xfrm>
+            <a:off x="1" y="114861"/>
+            <a:ext cx="6221505" cy="3713558"/>
+          </a:xfrm>
+          <a:prstGeom prst="rect">
+            <a:avLst/>
+          </a:prstGeom>
+        </p:spPr>
+      </p:pic>
+    </p:spTree>
+    <p:extLst>
+      <p:ext uri="{BB962C8B-B14F-4D97-AF65-F5344CB8AC3E}">
+        <p14:creationId xmlns:p14="http://schemas.microsoft.com/office/powerpoint/2010/main" val="3077694670"/>
       </p:ext>
     </p:extLst>
   </p:cSld>

</xml_diff>

<commit_message>
Add solar_radiation_multiplier field to the <reservoir> block in the Flow XML file. Flow.cpp, .h - Add Reach::GetSubreachShade-a-lator_W_m2(), but just with placeholder code. Add Reservoir::m_resSWmult. GlobalMethods.h, ReachRouting.cpp - Pass shortwave amount to ApplyEnergyFluxes() after doing the Shade-a-lator adjustment, instead of doing the Shade-a-lator adjustment in ApplyEnergyFluxes() itself.
</commit_message>
<xml_diff>
--- a/DataCW3M/CW3MdigitalHandbook/McKenzieGages.pptx
+++ b/DataCW3M/CW3MdigitalHandbook/McKenzieGages.pptx
@@ -11,7 +11,8 @@
     <p:sldId id="259" r:id="rId5"/>
     <p:sldId id="260" r:id="rId6"/>
     <p:sldId id="262" r:id="rId7"/>
-    <p:sldId id="261" r:id="rId8"/>
+    <p:sldId id="263" r:id="rId8"/>
+    <p:sldId id="261" r:id="rId9"/>
   </p:sldIdLst>
   <p:sldSz cx="12192000" cy="6858000"/>
   <p:notesSz cx="7099300" cy="9385300"/>
@@ -118,6 +119,1678 @@
 </p:presentation>
 </file>
 
+<file path=ppt/charts/chart1.xml><?xml version="1.0" encoding="utf-8"?>
+<c:chartSpace xmlns:c="http://schemas.openxmlformats.org/drawingml/2006/chart" xmlns:a="http://schemas.openxmlformats.org/drawingml/2006/main" xmlns:r="http://schemas.openxmlformats.org/officeDocument/2006/relationships" xmlns:c16r2="http://schemas.microsoft.com/office/drawing/2015/06/chart">
+  <c:date1904 val="0"/>
+  <c:lang val="en-US"/>
+  <c:roundedCorners val="0"/>
+  <mc:AlternateContent xmlns:mc="http://schemas.openxmlformats.org/markup-compatibility/2006">
+    <mc:Choice xmlns:c14="http://schemas.microsoft.com/office/drawing/2007/8/2/chart" Requires="c14">
+      <c14:style val="102"/>
+    </mc:Choice>
+    <mc:Fallback>
+      <c:style val="2"/>
+    </mc:Fallback>
+  </mc:AlternateContent>
+  <c:chart>
+    <c:title>
+      <c:tx>
+        <c:rich>
+          <a:bodyPr rot="0" spcFirstLastPara="1" vertOverflow="ellipsis" vert="horz" wrap="square" anchor="ctr" anchorCtr="1"/>
+          <a:lstStyle/>
+          <a:p>
+            <a:pPr>
+              <a:defRPr sz="1400" b="0" i="0" u="none" strike="noStrike" kern="1200" spc="0" baseline="0">
+                <a:solidFill>
+                  <a:schemeClr val="tx1">
+                    <a:lumMod val="65000"/>
+                    <a:lumOff val="35000"/>
+                  </a:schemeClr>
+                </a:solidFill>
+                <a:latin typeface="+mn-lt"/>
+                <a:ea typeface="+mn-ea"/>
+                <a:cs typeface="+mn-cs"/>
+              </a:defRPr>
+            </a:pPr>
+            <a:r>
+              <a:rPr lang="en-US"/>
+              <a:t>Simulated v. gaged temperature near</a:t>
+            </a:r>
+            <a:r>
+              <a:rPr lang="en-US" baseline="0"/>
+              <a:t> Hayden Bridge</a:t>
+            </a:r>
+            <a:r>
+              <a:rPr lang="en-US"/>
+              <a:t>, CW3M ver. 138</a:t>
+            </a:r>
+          </a:p>
+        </c:rich>
+      </c:tx>
+      <c:overlay val="0"/>
+      <c:spPr>
+        <a:noFill/>
+        <a:ln>
+          <a:noFill/>
+        </a:ln>
+        <a:effectLst/>
+      </c:spPr>
+      <c:txPr>
+        <a:bodyPr rot="0" spcFirstLastPara="1" vertOverflow="ellipsis" vert="horz" wrap="square" anchor="ctr" anchorCtr="1"/>
+        <a:lstStyle/>
+        <a:p>
+          <a:pPr>
+            <a:defRPr sz="1400" b="0" i="0" u="none" strike="noStrike" kern="1200" spc="0" baseline="0">
+              <a:solidFill>
+                <a:schemeClr val="tx1">
+                  <a:lumMod val="65000"/>
+                  <a:lumOff val="35000"/>
+                </a:schemeClr>
+              </a:solidFill>
+              <a:latin typeface="+mn-lt"/>
+              <a:ea typeface="+mn-ea"/>
+              <a:cs typeface="+mn-cs"/>
+            </a:defRPr>
+          </a:pPr>
+          <a:endParaRPr lang="en-US"/>
+        </a:p>
+      </c:txPr>
+    </c:title>
+    <c:autoTitleDeleted val="0"/>
+    <c:plotArea>
+      <c:layout/>
+      <c:lineChart>
+        <c:grouping val="standard"/>
+        <c:varyColors val="0"/>
+        <c:ser>
+          <c:idx val="0"/>
+          <c:order val="0"/>
+          <c:tx>
+            <c:strRef>
+              <c:f>'Statistics calculator'!$H$3</c:f>
+              <c:strCache>
+                <c:ptCount val="1"/>
+                <c:pt idx="0">
+                  <c:v> USGS_14164900_temp_MCKENZIE RIVER ABV HAYDEN BR  AT SPRINGFIELD  OR_23772751</c:v>
+                </c:pt>
+              </c:strCache>
+            </c:strRef>
+          </c:tx>
+          <c:spPr>
+            <a:ln w="28575" cap="rnd">
+              <a:solidFill>
+                <a:schemeClr val="accent1"/>
+              </a:solidFill>
+              <a:round/>
+            </a:ln>
+            <a:effectLst/>
+          </c:spPr>
+          <c:marker>
+            <c:symbol val="none"/>
+          </c:marker>
+          <c:val>
+            <c:numRef>
+              <c:f>'Statistics calculator'!$H$4:$H$112</c:f>
+              <c:numCache>
+                <c:formatCode>General</c:formatCode>
+                <c:ptCount val="109"/>
+                <c:pt idx="0">
+                  <c:v>5.6125340000000001</c:v>
+                </c:pt>
+                <c:pt idx="1">
+                  <c:v>6.2591970000000003</c:v>
+                </c:pt>
+                <c:pt idx="2">
+                  <c:v>7.754518</c:v>
+                </c:pt>
+                <c:pt idx="3">
+                  <c:v>8.7547270000000008</c:v>
+                </c:pt>
+                <c:pt idx="4">
+                  <c:v>10.624541000000001</c:v>
+                </c:pt>
+                <c:pt idx="5">
+                  <c:v>12.164341</c:v>
+                </c:pt>
+                <c:pt idx="6">
+                  <c:v>16.622938000000001</c:v>
+                </c:pt>
+                <c:pt idx="7">
+                  <c:v>17.00271</c:v>
+                </c:pt>
+                <c:pt idx="8">
+                  <c:v>17.8095</c:v>
+                </c:pt>
+                <c:pt idx="9">
+                  <c:v>15.58464</c:v>
+                </c:pt>
+                <c:pt idx="10">
+                  <c:v>8.4164530000000006</c:v>
+                </c:pt>
+                <c:pt idx="11">
+                  <c:v>5.1908659999999998</c:v>
+                </c:pt>
+                <c:pt idx="12">
+                  <c:v>5.0561069999999999</c:v>
+                </c:pt>
+                <c:pt idx="13">
+                  <c:v>5.558751</c:v>
+                </c:pt>
+                <c:pt idx="14">
+                  <c:v>6.6369410000000002</c:v>
+                </c:pt>
+                <c:pt idx="15">
+                  <c:v>8.1830739999999995</c:v>
+                </c:pt>
+                <c:pt idx="16">
+                  <c:v>10.079229</c:v>
+                </c:pt>
+                <c:pt idx="17">
+                  <c:v>11.804282000000001</c:v>
+                </c:pt>
+                <c:pt idx="18">
+                  <c:v>14.371176</c:v>
+                </c:pt>
+                <c:pt idx="19">
+                  <c:v>16.554711999999999</c:v>
+                </c:pt>
+                <c:pt idx="20">
+                  <c:v>18.410841000000001</c:v>
+                </c:pt>
+                <c:pt idx="21">
+                  <c:v>15.460839</c:v>
+                </c:pt>
+                <c:pt idx="22">
+                  <c:v>10.222044</c:v>
+                </c:pt>
+                <c:pt idx="23">
+                  <c:v>5.857526</c:v>
+                </c:pt>
+                <c:pt idx="24">
+                  <c:v>5.241117</c:v>
+                </c:pt>
+                <c:pt idx="25">
+                  <c:v>5.6672099999999999</c:v>
+                </c:pt>
+                <c:pt idx="26">
+                  <c:v>6.5680360000000002</c:v>
+                </c:pt>
+                <c:pt idx="27">
+                  <c:v>8.847073</c:v>
+                </c:pt>
+                <c:pt idx="28">
+                  <c:v>11.076184</c:v>
+                </c:pt>
+                <c:pt idx="29">
+                  <c:v>11.551807</c:v>
+                </c:pt>
+                <c:pt idx="30">
+                  <c:v>15.548947</c:v>
+                </c:pt>
+                <c:pt idx="31">
+                  <c:v>16.855340999999999</c:v>
+                </c:pt>
+                <c:pt idx="32">
+                  <c:v>18.729351000000001</c:v>
+                </c:pt>
+                <c:pt idx="33">
+                  <c:v>15.443604000000001</c:v>
+                </c:pt>
+                <c:pt idx="34">
+                  <c:v>8.3569209999999998</c:v>
+                </c:pt>
+                <c:pt idx="35">
+                  <c:v>5.1540809999999997</c:v>
+                </c:pt>
+                <c:pt idx="36">
+                  <c:v>4.9516939999999998</c:v>
+                </c:pt>
+                <c:pt idx="37">
+                  <c:v>5.8680349999999999</c:v>
+                </c:pt>
+                <c:pt idx="38">
+                  <c:v>7.4321679999999999</c:v>
+                </c:pt>
+                <c:pt idx="39">
+                  <c:v>9.0482790000000008</c:v>
+                </c:pt>
+                <c:pt idx="40">
+                  <c:v>11.396625</c:v>
+                </c:pt>
+                <c:pt idx="41">
+                  <c:v>14.320817999999999</c:v>
+                </c:pt>
+                <c:pt idx="42">
+                  <c:v>17.016932000000001</c:v>
+                </c:pt>
+                <c:pt idx="43">
+                  <c:v>16.684895999999998</c:v>
+                </c:pt>
+                <c:pt idx="44">
+                  <c:v>17.898012000000001</c:v>
+                </c:pt>
+                <c:pt idx="45">
+                  <c:v>13.979163</c:v>
+                </c:pt>
+                <c:pt idx="46">
+                  <c:v>9.0715249999999994</c:v>
+                </c:pt>
+                <c:pt idx="47">
+                  <c:v>5.3526230000000004</c:v>
+                </c:pt>
+                <c:pt idx="48">
+                  <c:v>5.7922969999999996</c:v>
+                </c:pt>
+                <c:pt idx="49">
+                  <c:v>5.5534929999999996</c:v>
+                </c:pt>
+                <c:pt idx="50">
+                  <c:v>7.5606200000000001</c:v>
+                </c:pt>
+                <c:pt idx="51">
+                  <c:v>9.5545259999999992</c:v>
+                </c:pt>
+                <c:pt idx="52">
+                  <c:v>11.654631999999999</c:v>
+                </c:pt>
+                <c:pt idx="53">
+                  <c:v>14.469351</c:v>
+                </c:pt>
+                <c:pt idx="54">
+                  <c:v>16.89209</c:v>
+                </c:pt>
+                <c:pt idx="55">
+                  <c:v>17.127911000000001</c:v>
+                </c:pt>
+                <c:pt idx="56">
+                  <c:v>18.921122</c:v>
+                </c:pt>
+                <c:pt idx="57">
+                  <c:v>16.247209999999999</c:v>
+                </c:pt>
+                <c:pt idx="58">
+                  <c:v>8.3450159999999993</c:v>
+                </c:pt>
+                <c:pt idx="59">
+                  <c:v>5.58371</c:v>
+                </c:pt>
+                <c:pt idx="60">
+                  <c:v>5.6587769999999997</c:v>
+                </c:pt>
+                <c:pt idx="61">
+                  <c:v>6.7420499999999999</c:v>
+                </c:pt>
+                <c:pt idx="62">
+                  <c:v>8.9501849999999994</c:v>
+                </c:pt>
+                <c:pt idx="63">
+                  <c:v>9.9892000000000003</c:v>
+                </c:pt>
+                <c:pt idx="64">
+                  <c:v>13.287138000000001</c:v>
+                </c:pt>
+                <c:pt idx="65">
+                  <c:v>16.428616000000002</c:v>
+                </c:pt>
+                <c:pt idx="66">
+                  <c:v>17.631253999999998</c:v>
+                </c:pt>
+                <c:pt idx="67">
+                  <c:v>17.754190000000001</c:v>
+                </c:pt>
+                <c:pt idx="68">
+                  <c:v>18.268187999999999</c:v>
+                </c:pt>
+                <c:pt idx="69">
+                  <c:v>17.181332000000001</c:v>
+                </c:pt>
+                <c:pt idx="70">
+                  <c:v>10.364996</c:v>
+                </c:pt>
+                <c:pt idx="71">
+                  <c:v>5.4250939999999996</c:v>
+                </c:pt>
+                <c:pt idx="72">
+                  <c:v>5.1203279999999998</c:v>
+                </c:pt>
+                <c:pt idx="73">
+                  <c:v>6.0267289999999996</c:v>
+                </c:pt>
+                <c:pt idx="74">
+                  <c:v>7.328335</c:v>
+                </c:pt>
+                <c:pt idx="75">
+                  <c:v>10.00975</c:v>
+                </c:pt>
+                <c:pt idx="76">
+                  <c:v>12.383094</c:v>
+                </c:pt>
+                <c:pt idx="77">
+                  <c:v>15.317595000000001</c:v>
+                </c:pt>
+                <c:pt idx="78">
+                  <c:v>16.518360000000001</c:v>
+                </c:pt>
+                <c:pt idx="79">
+                  <c:v>17.485367</c:v>
+                </c:pt>
+                <c:pt idx="80">
+                  <c:v>18.821987</c:v>
+                </c:pt>
+                <c:pt idx="81">
+                  <c:v>12.997336000000001</c:v>
+                </c:pt>
+                <c:pt idx="82">
+                  <c:v>7.9434019999999999</c:v>
+                </c:pt>
+                <c:pt idx="83">
+                  <c:v>4.7955759999999996</c:v>
+                </c:pt>
+                <c:pt idx="84">
+                  <c:v>2.9889250000000001</c:v>
+                </c:pt>
+                <c:pt idx="85">
+                  <c:v>4.3723429999999999</c:v>
+                </c:pt>
+                <c:pt idx="86">
+                  <c:v>6.0114669999999997</c:v>
+                </c:pt>
+                <c:pt idx="87">
+                  <c:v>8.4691130000000001</c:v>
+                </c:pt>
+                <c:pt idx="88">
+                  <c:v>11.492767000000001</c:v>
+                </c:pt>
+                <c:pt idx="89">
+                  <c:v>14.183911</c:v>
+                </c:pt>
+                <c:pt idx="90">
+                  <c:v>16.870294999999999</c:v>
+                </c:pt>
+                <c:pt idx="91">
+                  <c:v>15.494028999999999</c:v>
+                </c:pt>
+                <c:pt idx="92">
+                  <c:v>16.153469000000001</c:v>
+                </c:pt>
+                <c:pt idx="93">
+                  <c:v>12.021566999999999</c:v>
+                </c:pt>
+                <c:pt idx="94">
+                  <c:v>6.5215319999999997</c:v>
+                </c:pt>
+                <c:pt idx="95">
+                  <c:v>3.897367</c:v>
+                </c:pt>
+                <c:pt idx="96">
+                  <c:v>5.1540270000000001</c:v>
+                </c:pt>
+                <c:pt idx="97">
+                  <c:v>5.6925879999999998</c:v>
+                </c:pt>
+                <c:pt idx="98">
+                  <c:v>7.6571600000000002</c:v>
+                </c:pt>
+                <c:pt idx="99">
+                  <c:v>8.8609279999999995</c:v>
+                </c:pt>
+                <c:pt idx="100">
+                  <c:v>13.519973</c:v>
+                </c:pt>
+                <c:pt idx="101">
+                  <c:v>15.385897999999999</c:v>
+                </c:pt>
+                <c:pt idx="102">
+                  <c:v>17.730452</c:v>
+                </c:pt>
+                <c:pt idx="103">
+                  <c:v>17.579066999999998</c:v>
+                </c:pt>
+                <c:pt idx="104">
+                  <c:v>18.510386</c:v>
+                </c:pt>
+                <c:pt idx="105">
+                  <c:v>16.846264000000001</c:v>
+                </c:pt>
+                <c:pt idx="106">
+                  <c:v>11.492265</c:v>
+                </c:pt>
+                <c:pt idx="107">
+                  <c:v>5.8448719999999996</c:v>
+                </c:pt>
+              </c:numCache>
+            </c:numRef>
+          </c:val>
+          <c:smooth val="0"/>
+          <c:extLst>
+            <c:ext xmlns:c16="http://schemas.microsoft.com/office/drawing/2014/chart" uri="{C3380CC4-5D6E-409C-BE32-E72D297353CC}">
+              <c16:uniqueId val="{00000000-9628-4E3E-B75D-CAEF68733348}"/>
+            </c:ext>
+          </c:extLst>
+        </c:ser>
+        <c:ser>
+          <c:idx val="1"/>
+          <c:order val="1"/>
+          <c:tx>
+            <c:strRef>
+              <c:f>'Statistics calculator'!$I$3</c:f>
+              <c:strCache>
+                <c:ptCount val="1"/>
+                <c:pt idx="0">
+                  <c:v> Obs:..\Observations\McKenzie\USGS_14164900_temp_MCKENZIE RIVER ABV HAYDEN BR  AT SPRINGFIELD  OR_23772751.csv</c:v>
+                </c:pt>
+              </c:strCache>
+            </c:strRef>
+          </c:tx>
+          <c:spPr>
+            <a:ln w="28575" cap="rnd">
+              <a:solidFill>
+                <a:schemeClr val="accent2"/>
+              </a:solidFill>
+              <a:round/>
+            </a:ln>
+            <a:effectLst/>
+          </c:spPr>
+          <c:marker>
+            <c:symbol val="none"/>
+          </c:marker>
+          <c:val>
+            <c:numRef>
+              <c:f>'Statistics calculator'!$I$4:$I$112</c:f>
+              <c:numCache>
+                <c:formatCode>General</c:formatCode>
+                <c:ptCount val="109"/>
+                <c:pt idx="0">
+                  <c:v>6.7575260000000004</c:v>
+                </c:pt>
+                <c:pt idx="1">
+                  <c:v>7.0468979999999997</c:v>
+                </c:pt>
+                <c:pt idx="2">
+                  <c:v>7.5625140000000002</c:v>
+                </c:pt>
+                <c:pt idx="3">
+                  <c:v>8.5006950000000003</c:v>
+                </c:pt>
+                <c:pt idx="4">
+                  <c:v>10.083938</c:v>
+                </c:pt>
+                <c:pt idx="5">
+                  <c:v>11.837152</c:v>
+                </c:pt>
+                <c:pt idx="6">
+                  <c:v>16.065334</c:v>
+                </c:pt>
+                <c:pt idx="7">
+                  <c:v>15.599329000000001</c:v>
+                </c:pt>
+                <c:pt idx="8">
+                  <c:v>13.234444999999999</c:v>
+                </c:pt>
+                <c:pt idx="9">
+                  <c:v>11.104032999999999</c:v>
+                </c:pt>
+                <c:pt idx="10">
+                  <c:v>7.7684309999999996</c:v>
+                </c:pt>
+                <c:pt idx="11">
+                  <c:v>6.5254580000000004</c:v>
+                </c:pt>
+                <c:pt idx="12">
+                  <c:v>5.8123259999999997</c:v>
+                </c:pt>
+                <c:pt idx="13">
+                  <c:v>5.5251479999999997</c:v>
+                </c:pt>
+                <c:pt idx="14">
+                  <c:v>6.5961270000000001</c:v>
+                </c:pt>
+                <c:pt idx="15">
+                  <c:v>7.4708329999999998</c:v>
+                </c:pt>
+                <c:pt idx="16">
+                  <c:v>8.912903</c:v>
+                </c:pt>
+                <c:pt idx="17">
+                  <c:v>10.841665000000001</c:v>
+                </c:pt>
+                <c:pt idx="18">
+                  <c:v>13.848522000000001</c:v>
+                </c:pt>
+                <c:pt idx="19">
+                  <c:v>15.150067999999999</c:v>
+                </c:pt>
+                <c:pt idx="20">
+                  <c:v>12.886526999999999</c:v>
+                </c:pt>
+                <c:pt idx="21">
+                  <c:v>10.686559000000001</c:v>
+                </c:pt>
+                <c:pt idx="22">
+                  <c:v>7.3908750000000003</c:v>
+                </c:pt>
+                <c:pt idx="23">
+                  <c:v>4.6762090000000001</c:v>
+                </c:pt>
+                <c:pt idx="24">
+                  <c:v>5.7243950000000003</c:v>
+                </c:pt>
+                <c:pt idx="25">
+                  <c:v>6.0212640000000004</c:v>
+                </c:pt>
+                <c:pt idx="26">
+                  <c:v>6.2946020000000003</c:v>
+                </c:pt>
+                <c:pt idx="27">
+                  <c:v>8.0125010000000003</c:v>
+                </c:pt>
+                <c:pt idx="28">
+                  <c:v>9.9014100000000003</c:v>
+                </c:pt>
+                <c:pt idx="29">
+                  <c:v>11.643750000000001</c:v>
+                </c:pt>
+                <c:pt idx="30">
+                  <c:v>14.857324999999999</c:v>
+                </c:pt>
+                <c:pt idx="31">
+                  <c:v>15.432864</c:v>
+                </c:pt>
+                <c:pt idx="32">
+                  <c:v>12.870347000000001</c:v>
+                </c:pt>
+                <c:pt idx="33">
+                  <c:v>10.587904999999999</c:v>
+                </c:pt>
+                <c:pt idx="34">
+                  <c:v>8.4551409999999994</c:v>
+                </c:pt>
+                <c:pt idx="35">
+                  <c:v>6.7407919999999999</c:v>
+                </c:pt>
+                <c:pt idx="36">
+                  <c:v>4.9180770000000003</c:v>
+                </c:pt>
+                <c:pt idx="37">
+                  <c:v>6.1956850000000001</c:v>
+                </c:pt>
+                <c:pt idx="38">
+                  <c:v>7.492057</c:v>
+                </c:pt>
+                <c:pt idx="39">
+                  <c:v>8.5971530000000005</c:v>
+                </c:pt>
+                <c:pt idx="40">
+                  <c:v>11.077218</c:v>
+                </c:pt>
+                <c:pt idx="41">
+                  <c:v>13.704166000000001</c:v>
+                </c:pt>
+                <c:pt idx="42">
+                  <c:v>16.750347000000001</c:v>
+                </c:pt>
+                <c:pt idx="43">
+                  <c:v>15.772145</c:v>
+                </c:pt>
+                <c:pt idx="44">
+                  <c:v>13.215868</c:v>
+                </c:pt>
+                <c:pt idx="45">
+                  <c:v>9.9914310000000004</c:v>
+                </c:pt>
+                <c:pt idx="46">
+                  <c:v>7.4102540000000001</c:v>
+                </c:pt>
+                <c:pt idx="47">
+                  <c:v>4.2807459999999997</c:v>
+                </c:pt>
+                <c:pt idx="48">
+                  <c:v>5.2900869999999998</c:v>
+                </c:pt>
+                <c:pt idx="49">
+                  <c:v>5.9716139999999998</c:v>
+                </c:pt>
+                <c:pt idx="50">
+                  <c:v>7.3243400000000003</c:v>
+                </c:pt>
+                <c:pt idx="51">
+                  <c:v>8.8320469999999993</c:v>
+                </c:pt>
+                <c:pt idx="52">
+                  <c:v>11.221339</c:v>
+                </c:pt>
+                <c:pt idx="53">
+                  <c:v>13.324306</c:v>
+                </c:pt>
+                <c:pt idx="54">
+                  <c:v>16.180609</c:v>
+                </c:pt>
+                <c:pt idx="55">
+                  <c:v>15.435485</c:v>
+                </c:pt>
+                <c:pt idx="56">
+                  <c:v>13.738193000000001</c:v>
+                </c:pt>
+                <c:pt idx="57">
+                  <c:v>11.838914000000001</c:v>
+                </c:pt>
+                <c:pt idx="58">
+                  <c:v>8.3758119999999998</c:v>
+                </c:pt>
+                <c:pt idx="59">
+                  <c:v>7.792554</c:v>
+                </c:pt>
+                <c:pt idx="60">
+                  <c:v>6.7203629999999999</c:v>
+                </c:pt>
+                <c:pt idx="61">
+                  <c:v>7.6048359999999997</c:v>
+                </c:pt>
+                <c:pt idx="62">
+                  <c:v>8.8436210000000006</c:v>
+                </c:pt>
+                <c:pt idx="63">
+                  <c:v>10.058611000000001</c:v>
+                </c:pt>
+                <c:pt idx="64">
+                  <c:v>13.074730000000001</c:v>
+                </c:pt>
+                <c:pt idx="65">
+                  <c:v>16.857534000000001</c:v>
+                </c:pt>
+                <c:pt idx="66">
+                  <c:v>18.027048000000001</c:v>
+                </c:pt>
+                <c:pt idx="67">
+                  <c:v>17.185048999999999</c:v>
+                </c:pt>
+                <c:pt idx="68">
+                  <c:v>14.390521</c:v>
+                </c:pt>
+                <c:pt idx="69">
+                  <c:v>11.777958</c:v>
+                </c:pt>
+                <c:pt idx="70">
+                  <c:v>8.0507980000000003</c:v>
+                </c:pt>
+                <c:pt idx="71">
+                  <c:v>7.1561149999999998</c:v>
+                </c:pt>
+                <c:pt idx="72">
+                  <c:v>6.2070230000000004</c:v>
+                </c:pt>
+                <c:pt idx="73">
+                  <c:v>7.2024429999999997</c:v>
+                </c:pt>
+                <c:pt idx="74">
+                  <c:v>7.5207629999999996</c:v>
+                </c:pt>
+                <c:pt idx="75">
+                  <c:v>10.099689</c:v>
+                </c:pt>
+                <c:pt idx="76">
+                  <c:v>12.167942999999999</c:v>
+                </c:pt>
+                <c:pt idx="77">
+                  <c:v>14.868748</c:v>
+                </c:pt>
+                <c:pt idx="78">
+                  <c:v>16.696805999999999</c:v>
+                </c:pt>
+                <c:pt idx="79">
+                  <c:v>16.748556000000001</c:v>
+                </c:pt>
+                <c:pt idx="80">
+                  <c:v>14.161457</c:v>
+                </c:pt>
+                <c:pt idx="81">
+                  <c:v>11.1876</c:v>
+                </c:pt>
+                <c:pt idx="82">
+                  <c:v>9.3414070000000002</c:v>
+                </c:pt>
+                <c:pt idx="83">
+                  <c:v>6.1767459999999996</c:v>
+                </c:pt>
+                <c:pt idx="84">
+                  <c:v>4.7506050000000002</c:v>
+                </c:pt>
+                <c:pt idx="85">
+                  <c:v>6.3771940000000003</c:v>
+                </c:pt>
+                <c:pt idx="86">
+                  <c:v>7.0906229999999999</c:v>
+                </c:pt>
+                <c:pt idx="87">
+                  <c:v>8.3418410000000005</c:v>
+                </c:pt>
+                <c:pt idx="88">
+                  <c:v>10.444659</c:v>
+                </c:pt>
+                <c:pt idx="89">
+                  <c:v>13.197846</c:v>
+                </c:pt>
+                <c:pt idx="90">
+                  <c:v>16.418118</c:v>
+                </c:pt>
+                <c:pt idx="91">
+                  <c:v>14.948691</c:v>
+                </c:pt>
+                <c:pt idx="92">
+                  <c:v>12.859022</c:v>
+                </c:pt>
+                <c:pt idx="93">
+                  <c:v>10.140311000000001</c:v>
+                </c:pt>
+                <c:pt idx="94">
+                  <c:v>7.9655129999999996</c:v>
+                </c:pt>
+                <c:pt idx="95">
+                  <c:v>5.5748559999999996</c:v>
+                </c:pt>
+                <c:pt idx="96">
+                  <c:v>6.7227480000000002</c:v>
+                </c:pt>
+                <c:pt idx="97">
+                  <c:v>6.0133390000000002</c:v>
+                </c:pt>
+                <c:pt idx="98">
+                  <c:v>7.0182650000000004</c:v>
+                </c:pt>
+                <c:pt idx="99">
+                  <c:v>8.6028570000000002</c:v>
+                </c:pt>
+                <c:pt idx="100">
+                  <c:v>11.752383999999999</c:v>
+                </c:pt>
+                <c:pt idx="101">
+                  <c:v>13.440951999999999</c:v>
+                </c:pt>
+                <c:pt idx="102">
+                  <c:v>16.549931999999998</c:v>
+                </c:pt>
+                <c:pt idx="103">
+                  <c:v>16.771944000000001</c:v>
+                </c:pt>
+                <c:pt idx="104">
+                  <c:v>13.094060000000001</c:v>
+                </c:pt>
+                <c:pt idx="105">
+                  <c:v>10.210146</c:v>
+                </c:pt>
+                <c:pt idx="106">
+                  <c:v>7.540826</c:v>
+                </c:pt>
+                <c:pt idx="107">
+                  <c:v>6.1656829999999996</c:v>
+                </c:pt>
+              </c:numCache>
+            </c:numRef>
+          </c:val>
+          <c:smooth val="0"/>
+          <c:extLst>
+            <c:ext xmlns:c16="http://schemas.microsoft.com/office/drawing/2014/chart" uri="{C3380CC4-5D6E-409C-BE32-E72D297353CC}">
+              <c16:uniqueId val="{00000001-9628-4E3E-B75D-CAEF68733348}"/>
+            </c:ext>
+          </c:extLst>
+        </c:ser>
+        <c:dLbls>
+          <c:showLegendKey val="0"/>
+          <c:showVal val="0"/>
+          <c:showCatName val="0"/>
+          <c:showSerName val="0"/>
+          <c:showPercent val="0"/>
+          <c:showBubbleSize val="0"/>
+        </c:dLbls>
+        <c:smooth val="0"/>
+        <c:axId val="58066224"/>
+        <c:axId val="156437344"/>
+      </c:lineChart>
+      <c:catAx>
+        <c:axId val="58066224"/>
+        <c:scaling>
+          <c:orientation val="minMax"/>
+        </c:scaling>
+        <c:delete val="0"/>
+        <c:axPos val="b"/>
+        <c:title>
+          <c:tx>
+            <c:rich>
+              <a:bodyPr rot="0" spcFirstLastPara="1" vertOverflow="ellipsis" vert="horz" wrap="square" anchor="ctr" anchorCtr="1"/>
+              <a:lstStyle/>
+              <a:p>
+                <a:pPr>
+                  <a:defRPr sz="1000" b="0" i="0" u="none" strike="noStrike" kern="1200" baseline="0">
+                    <a:solidFill>
+                      <a:schemeClr val="tx1">
+                        <a:lumMod val="65000"/>
+                        <a:lumOff val="35000"/>
+                      </a:schemeClr>
+                    </a:solidFill>
+                    <a:latin typeface="+mn-lt"/>
+                    <a:ea typeface="+mn-ea"/>
+                    <a:cs typeface="+mn-cs"/>
+                  </a:defRPr>
+                </a:pPr>
+                <a:r>
+                  <a:rPr lang="en-US"/>
+                  <a:t>month index in 2010-18</a:t>
+                </a:r>
+              </a:p>
+            </c:rich>
+          </c:tx>
+          <c:overlay val="0"/>
+          <c:spPr>
+            <a:noFill/>
+            <a:ln>
+              <a:noFill/>
+            </a:ln>
+            <a:effectLst/>
+          </c:spPr>
+          <c:txPr>
+            <a:bodyPr rot="0" spcFirstLastPara="1" vertOverflow="ellipsis" vert="horz" wrap="square" anchor="ctr" anchorCtr="1"/>
+            <a:lstStyle/>
+            <a:p>
+              <a:pPr>
+                <a:defRPr sz="1000" b="0" i="0" u="none" strike="noStrike" kern="1200" baseline="0">
+                  <a:solidFill>
+                    <a:schemeClr val="tx1">
+                      <a:lumMod val="65000"/>
+                      <a:lumOff val="35000"/>
+                    </a:schemeClr>
+                  </a:solidFill>
+                  <a:latin typeface="+mn-lt"/>
+                  <a:ea typeface="+mn-ea"/>
+                  <a:cs typeface="+mn-cs"/>
+                </a:defRPr>
+              </a:pPr>
+              <a:endParaRPr lang="en-US"/>
+            </a:p>
+          </c:txPr>
+        </c:title>
+        <c:majorTickMark val="none"/>
+        <c:minorTickMark val="none"/>
+        <c:tickLblPos val="nextTo"/>
+        <c:spPr>
+          <a:noFill/>
+          <a:ln w="9525" cap="flat" cmpd="sng" algn="ctr">
+            <a:solidFill>
+              <a:schemeClr val="tx1">
+                <a:lumMod val="15000"/>
+                <a:lumOff val="85000"/>
+              </a:schemeClr>
+            </a:solidFill>
+            <a:round/>
+          </a:ln>
+          <a:effectLst/>
+        </c:spPr>
+        <c:txPr>
+          <a:bodyPr rot="-60000000" spcFirstLastPara="1" vertOverflow="ellipsis" vert="horz" wrap="square" anchor="ctr" anchorCtr="1"/>
+          <a:lstStyle/>
+          <a:p>
+            <a:pPr>
+              <a:defRPr sz="900" b="0" i="0" u="none" strike="noStrike" kern="1200" baseline="0">
+                <a:solidFill>
+                  <a:schemeClr val="tx1">
+                    <a:lumMod val="65000"/>
+                    <a:lumOff val="35000"/>
+                  </a:schemeClr>
+                </a:solidFill>
+                <a:latin typeface="+mn-lt"/>
+                <a:ea typeface="+mn-ea"/>
+                <a:cs typeface="+mn-cs"/>
+              </a:defRPr>
+            </a:pPr>
+            <a:endParaRPr lang="en-US"/>
+          </a:p>
+        </c:txPr>
+        <c:crossAx val="156437344"/>
+        <c:crosses val="autoZero"/>
+        <c:auto val="1"/>
+        <c:lblAlgn val="ctr"/>
+        <c:lblOffset val="100"/>
+        <c:noMultiLvlLbl val="0"/>
+      </c:catAx>
+      <c:valAx>
+        <c:axId val="156437344"/>
+        <c:scaling>
+          <c:orientation val="minMax"/>
+        </c:scaling>
+        <c:delete val="0"/>
+        <c:axPos val="l"/>
+        <c:majorGridlines>
+          <c:spPr>
+            <a:ln w="9525" cap="flat" cmpd="sng" algn="ctr">
+              <a:solidFill>
+                <a:schemeClr val="tx1">
+                  <a:lumMod val="15000"/>
+                  <a:lumOff val="85000"/>
+                </a:schemeClr>
+              </a:solidFill>
+              <a:round/>
+            </a:ln>
+            <a:effectLst/>
+          </c:spPr>
+        </c:majorGridlines>
+        <c:title>
+          <c:tx>
+            <c:rich>
+              <a:bodyPr rot="-5400000" spcFirstLastPara="1" vertOverflow="ellipsis" vert="horz" wrap="square" anchor="ctr" anchorCtr="1"/>
+              <a:lstStyle/>
+              <a:p>
+                <a:pPr>
+                  <a:defRPr sz="1000" b="0" i="0" u="none" strike="noStrike" kern="1200" baseline="0">
+                    <a:solidFill>
+                      <a:schemeClr val="tx1">
+                        <a:lumMod val="65000"/>
+                        <a:lumOff val="35000"/>
+                      </a:schemeClr>
+                    </a:solidFill>
+                    <a:latin typeface="+mn-lt"/>
+                    <a:ea typeface="+mn-ea"/>
+                    <a:cs typeface="+mn-cs"/>
+                  </a:defRPr>
+                </a:pPr>
+                <a:r>
+                  <a:rPr lang="en-US"/>
+                  <a:t>deg C</a:t>
+                </a:r>
+              </a:p>
+            </c:rich>
+          </c:tx>
+          <c:overlay val="0"/>
+          <c:spPr>
+            <a:noFill/>
+            <a:ln>
+              <a:noFill/>
+            </a:ln>
+            <a:effectLst/>
+          </c:spPr>
+          <c:txPr>
+            <a:bodyPr rot="-5400000" spcFirstLastPara="1" vertOverflow="ellipsis" vert="horz" wrap="square" anchor="ctr" anchorCtr="1"/>
+            <a:lstStyle/>
+            <a:p>
+              <a:pPr>
+                <a:defRPr sz="1000" b="0" i="0" u="none" strike="noStrike" kern="1200" baseline="0">
+                  <a:solidFill>
+                    <a:schemeClr val="tx1">
+                      <a:lumMod val="65000"/>
+                      <a:lumOff val="35000"/>
+                    </a:schemeClr>
+                  </a:solidFill>
+                  <a:latin typeface="+mn-lt"/>
+                  <a:ea typeface="+mn-ea"/>
+                  <a:cs typeface="+mn-cs"/>
+                </a:defRPr>
+              </a:pPr>
+              <a:endParaRPr lang="en-US"/>
+            </a:p>
+          </c:txPr>
+        </c:title>
+        <c:numFmt formatCode="General" sourceLinked="1"/>
+        <c:majorTickMark val="none"/>
+        <c:minorTickMark val="none"/>
+        <c:tickLblPos val="nextTo"/>
+        <c:spPr>
+          <a:noFill/>
+          <a:ln>
+            <a:noFill/>
+          </a:ln>
+          <a:effectLst/>
+        </c:spPr>
+        <c:txPr>
+          <a:bodyPr rot="-60000000" spcFirstLastPara="1" vertOverflow="ellipsis" vert="horz" wrap="square" anchor="ctr" anchorCtr="1"/>
+          <a:lstStyle/>
+          <a:p>
+            <a:pPr>
+              <a:defRPr sz="900" b="0" i="0" u="none" strike="noStrike" kern="1200" baseline="0">
+                <a:solidFill>
+                  <a:schemeClr val="tx1">
+                    <a:lumMod val="65000"/>
+                    <a:lumOff val="35000"/>
+                  </a:schemeClr>
+                </a:solidFill>
+                <a:latin typeface="+mn-lt"/>
+                <a:ea typeface="+mn-ea"/>
+                <a:cs typeface="+mn-cs"/>
+              </a:defRPr>
+            </a:pPr>
+            <a:endParaRPr lang="en-US"/>
+          </a:p>
+        </c:txPr>
+        <c:crossAx val="58066224"/>
+        <c:crosses val="autoZero"/>
+        <c:crossBetween val="between"/>
+      </c:valAx>
+      <c:spPr>
+        <a:noFill/>
+        <a:ln>
+          <a:noFill/>
+        </a:ln>
+        <a:effectLst/>
+      </c:spPr>
+    </c:plotArea>
+    <c:legend>
+      <c:legendPos val="b"/>
+      <c:overlay val="0"/>
+      <c:spPr>
+        <a:noFill/>
+        <a:ln>
+          <a:noFill/>
+        </a:ln>
+        <a:effectLst/>
+      </c:spPr>
+      <c:txPr>
+        <a:bodyPr rot="0" spcFirstLastPara="1" vertOverflow="ellipsis" vert="horz" wrap="square" anchor="ctr" anchorCtr="1"/>
+        <a:lstStyle/>
+        <a:p>
+          <a:pPr>
+            <a:defRPr sz="900" b="0" i="0" u="none" strike="noStrike" kern="1200" baseline="0">
+              <a:solidFill>
+                <a:schemeClr val="tx1">
+                  <a:lumMod val="65000"/>
+                  <a:lumOff val="35000"/>
+                </a:schemeClr>
+              </a:solidFill>
+              <a:latin typeface="+mn-lt"/>
+              <a:ea typeface="+mn-ea"/>
+              <a:cs typeface="+mn-cs"/>
+            </a:defRPr>
+          </a:pPr>
+          <a:endParaRPr lang="en-US"/>
+        </a:p>
+      </c:txPr>
+    </c:legend>
+    <c:plotVisOnly val="1"/>
+    <c:dispBlanksAs val="gap"/>
+    <c:extLst>
+      <c:ext xmlns:c16r3="http://schemas.microsoft.com/office/drawing/2017/03/chart" uri="{56B9EC1D-385E-4148-901F-78D8002777C0}">
+        <c16r3:dataDisplayOptions16>
+          <c16r3:dispNaAsBlank val="1"/>
+        </c16r3:dataDisplayOptions16>
+      </c:ext>
+    </c:extLst>
+    <c:showDLblsOverMax val="0"/>
+  </c:chart>
+  <c:spPr>
+    <a:noFill/>
+    <a:ln>
+      <a:noFill/>
+    </a:ln>
+    <a:effectLst/>
+  </c:spPr>
+  <c:txPr>
+    <a:bodyPr/>
+    <a:lstStyle/>
+    <a:p>
+      <a:pPr>
+        <a:defRPr/>
+      </a:pPr>
+      <a:endParaRPr lang="en-US"/>
+    </a:p>
+  </c:txPr>
+  <c:externalData r:id="rId3">
+    <c:autoUpdate val="0"/>
+  </c:externalData>
+</c:chartSpace>
+</file>
+
+<file path=ppt/charts/colors1.xml><?xml version="1.0" encoding="utf-8"?>
+<cs:colorStyle xmlns:cs="http://schemas.microsoft.com/office/drawing/2012/chartStyle" xmlns:a="http://schemas.openxmlformats.org/drawingml/2006/main" meth="cycle" id="10">
+  <a:schemeClr val="accent1"/>
+  <a:schemeClr val="accent2"/>
+  <a:schemeClr val="accent3"/>
+  <a:schemeClr val="accent4"/>
+  <a:schemeClr val="accent5"/>
+  <a:schemeClr val="accent6"/>
+  <cs:variation/>
+  <cs:variation>
+    <a:lumMod val="60000"/>
+  </cs:variation>
+  <cs:variation>
+    <a:lumMod val="80000"/>
+    <a:lumOff val="20000"/>
+  </cs:variation>
+  <cs:variation>
+    <a:lumMod val="80000"/>
+  </cs:variation>
+  <cs:variation>
+    <a:lumMod val="60000"/>
+    <a:lumOff val="40000"/>
+  </cs:variation>
+  <cs:variation>
+    <a:lumMod val="50000"/>
+  </cs:variation>
+  <cs:variation>
+    <a:lumMod val="70000"/>
+    <a:lumOff val="30000"/>
+  </cs:variation>
+  <cs:variation>
+    <a:lumMod val="70000"/>
+  </cs:variation>
+  <cs:variation>
+    <a:lumMod val="50000"/>
+    <a:lumOff val="50000"/>
+  </cs:variation>
+</cs:colorStyle>
+</file>
+
+<file path=ppt/charts/style1.xml><?xml version="1.0" encoding="utf-8"?>
+<cs:chartStyle xmlns:cs="http://schemas.microsoft.com/office/drawing/2012/chartStyle" xmlns:a="http://schemas.openxmlformats.org/drawingml/2006/main" id="227">
+  <cs:axisTitle>
+    <cs:lnRef idx="0"/>
+    <cs:fillRef idx="0"/>
+    <cs:effectRef idx="0"/>
+    <cs:fontRef idx="minor">
+      <a:schemeClr val="tx1">
+        <a:lumMod val="65000"/>
+        <a:lumOff val="35000"/>
+      </a:schemeClr>
+    </cs:fontRef>
+    <cs:defRPr sz="1000" kern="1200"/>
+  </cs:axisTitle>
+  <cs:categoryAxis>
+    <cs:lnRef idx="0"/>
+    <cs:fillRef idx="0"/>
+    <cs:effectRef idx="0"/>
+    <cs:fontRef idx="minor">
+      <a:schemeClr val="tx1">
+        <a:lumMod val="65000"/>
+        <a:lumOff val="35000"/>
+      </a:schemeClr>
+    </cs:fontRef>
+    <cs:spPr>
+      <a:ln w="9525" cap="flat" cmpd="sng" algn="ctr">
+        <a:solidFill>
+          <a:schemeClr val="tx1">
+            <a:lumMod val="15000"/>
+            <a:lumOff val="85000"/>
+          </a:schemeClr>
+        </a:solidFill>
+        <a:round/>
+      </a:ln>
+    </cs:spPr>
+    <cs:defRPr sz="900" kern="1200"/>
+  </cs:categoryAxis>
+  <cs:chartArea mods="allowNoFillOverride allowNoLineOverride">
+    <cs:lnRef idx="0"/>
+    <cs:fillRef idx="0"/>
+    <cs:effectRef idx="0"/>
+    <cs:fontRef idx="minor">
+      <a:schemeClr val="tx1"/>
+    </cs:fontRef>
+    <cs:spPr>
+      <a:solidFill>
+        <a:schemeClr val="bg1"/>
+      </a:solidFill>
+      <a:ln w="9525" cap="flat" cmpd="sng" algn="ctr">
+        <a:solidFill>
+          <a:schemeClr val="tx1">
+            <a:lumMod val="15000"/>
+            <a:lumOff val="85000"/>
+          </a:schemeClr>
+        </a:solidFill>
+        <a:round/>
+      </a:ln>
+    </cs:spPr>
+    <cs:defRPr sz="1000" kern="1200"/>
+  </cs:chartArea>
+  <cs:dataLabel>
+    <cs:lnRef idx="0"/>
+    <cs:fillRef idx="0"/>
+    <cs:effectRef idx="0"/>
+    <cs:fontRef idx="minor">
+      <a:schemeClr val="tx1">
+        <a:lumMod val="75000"/>
+        <a:lumOff val="25000"/>
+      </a:schemeClr>
+    </cs:fontRef>
+    <cs:defRPr sz="900" kern="1200"/>
+  </cs:dataLabel>
+  <cs:dataLabelCallout>
+    <cs:lnRef idx="0"/>
+    <cs:fillRef idx="0"/>
+    <cs:effectRef idx="0"/>
+    <cs:fontRef idx="minor">
+      <a:schemeClr val="dk1">
+        <a:lumMod val="65000"/>
+        <a:lumOff val="35000"/>
+      </a:schemeClr>
+    </cs:fontRef>
+    <cs:spPr>
+      <a:solidFill>
+        <a:schemeClr val="lt1"/>
+      </a:solidFill>
+      <a:ln>
+        <a:solidFill>
+          <a:schemeClr val="dk1">
+            <a:lumMod val="25000"/>
+            <a:lumOff val="75000"/>
+          </a:schemeClr>
+        </a:solidFill>
+      </a:ln>
+    </cs:spPr>
+    <cs:defRPr sz="900" kern="1200"/>
+    <cs:bodyPr rot="0" spcFirstLastPara="1" vertOverflow="clip" horzOverflow="clip" vert="horz" wrap="square" lIns="36576" tIns="18288" rIns="36576" bIns="18288" anchor="ctr" anchorCtr="1">
+      <a:spAutoFit/>
+    </cs:bodyPr>
+  </cs:dataLabelCallout>
+  <cs:dataPoint>
+    <cs:lnRef idx="0"/>
+    <cs:fillRef idx="1">
+      <cs:styleClr val="auto"/>
+    </cs:fillRef>
+    <cs:effectRef idx="0"/>
+    <cs:fontRef idx="minor">
+      <a:schemeClr val="tx1"/>
+    </cs:fontRef>
+    <cs:spPr>
+      <a:solidFill>
+        <a:schemeClr val="phClr"/>
+      </a:solidFill>
+    </cs:spPr>
+  </cs:dataPoint>
+  <cs:dataPoint3D>
+    <cs:lnRef idx="0"/>
+    <cs:fillRef idx="1">
+      <cs:styleClr val="auto"/>
+    </cs:fillRef>
+    <cs:effectRef idx="0"/>
+    <cs:fontRef idx="minor">
+      <a:schemeClr val="tx1"/>
+    </cs:fontRef>
+    <cs:spPr>
+      <a:solidFill>
+        <a:schemeClr val="phClr"/>
+      </a:solidFill>
+    </cs:spPr>
+  </cs:dataPoint3D>
+  <cs:dataPointLine>
+    <cs:lnRef idx="0">
+      <cs:styleClr val="auto"/>
+    </cs:lnRef>
+    <cs:fillRef idx="1"/>
+    <cs:effectRef idx="0"/>
+    <cs:fontRef idx="minor">
+      <a:schemeClr val="tx1"/>
+    </cs:fontRef>
+    <cs:spPr>
+      <a:ln w="28575" cap="rnd">
+        <a:solidFill>
+          <a:schemeClr val="phClr"/>
+        </a:solidFill>
+        <a:round/>
+      </a:ln>
+    </cs:spPr>
+  </cs:dataPointLine>
+  <cs:dataPointMarker>
+    <cs:lnRef idx="0">
+      <cs:styleClr val="auto"/>
+    </cs:lnRef>
+    <cs:fillRef idx="1">
+      <cs:styleClr val="auto"/>
+    </cs:fillRef>
+    <cs:effectRef idx="0"/>
+    <cs:fontRef idx="minor">
+      <a:schemeClr val="tx1"/>
+    </cs:fontRef>
+    <cs:spPr>
+      <a:solidFill>
+        <a:schemeClr val="phClr"/>
+      </a:solidFill>
+      <a:ln w="9525">
+        <a:solidFill>
+          <a:schemeClr val="phClr"/>
+        </a:solidFill>
+      </a:ln>
+    </cs:spPr>
+  </cs:dataPointMarker>
+  <cs:dataPointMarkerLayout symbol="circle" size="5"/>
+  <cs:dataPointWireframe>
+    <cs:lnRef idx="0">
+      <cs:styleClr val="auto"/>
+    </cs:lnRef>
+    <cs:fillRef idx="1"/>
+    <cs:effectRef idx="0"/>
+    <cs:fontRef idx="minor">
+      <a:schemeClr val="tx1"/>
+    </cs:fontRef>
+    <cs:spPr>
+      <a:ln w="9525" cap="rnd">
+        <a:solidFill>
+          <a:schemeClr val="phClr"/>
+        </a:solidFill>
+        <a:round/>
+      </a:ln>
+    </cs:spPr>
+  </cs:dataPointWireframe>
+  <cs:dataTable>
+    <cs:lnRef idx="0"/>
+    <cs:fillRef idx="0"/>
+    <cs:effectRef idx="0"/>
+    <cs:fontRef idx="minor">
+      <a:schemeClr val="tx1">
+        <a:lumMod val="65000"/>
+        <a:lumOff val="35000"/>
+      </a:schemeClr>
+    </cs:fontRef>
+    <cs:spPr>
+      <a:noFill/>
+      <a:ln w="9525" cap="flat" cmpd="sng" algn="ctr">
+        <a:solidFill>
+          <a:schemeClr val="tx1">
+            <a:lumMod val="15000"/>
+            <a:lumOff val="85000"/>
+          </a:schemeClr>
+        </a:solidFill>
+        <a:round/>
+      </a:ln>
+    </cs:spPr>
+    <cs:defRPr sz="900" kern="1200"/>
+  </cs:dataTable>
+  <cs:downBar>
+    <cs:lnRef idx="0"/>
+    <cs:fillRef idx="0"/>
+    <cs:effectRef idx="0"/>
+    <cs:fontRef idx="minor">
+      <a:schemeClr val="dk1"/>
+    </cs:fontRef>
+    <cs:spPr>
+      <a:solidFill>
+        <a:schemeClr val="dk1">
+          <a:lumMod val="65000"/>
+          <a:lumOff val="35000"/>
+        </a:schemeClr>
+      </a:solidFill>
+      <a:ln w="9525">
+        <a:solidFill>
+          <a:schemeClr val="tx1">
+            <a:lumMod val="65000"/>
+            <a:lumOff val="35000"/>
+          </a:schemeClr>
+        </a:solidFill>
+      </a:ln>
+    </cs:spPr>
+  </cs:downBar>
+  <cs:dropLine>
+    <cs:lnRef idx="0"/>
+    <cs:fillRef idx="0"/>
+    <cs:effectRef idx="0"/>
+    <cs:fontRef idx="minor">
+      <a:schemeClr val="tx1"/>
+    </cs:fontRef>
+    <cs:spPr>
+      <a:ln w="9525" cap="flat" cmpd="sng" algn="ctr">
+        <a:solidFill>
+          <a:schemeClr val="tx1">
+            <a:lumMod val="35000"/>
+            <a:lumOff val="65000"/>
+          </a:schemeClr>
+        </a:solidFill>
+        <a:round/>
+      </a:ln>
+    </cs:spPr>
+  </cs:dropLine>
+  <cs:errorBar>
+    <cs:lnRef idx="0"/>
+    <cs:fillRef idx="0"/>
+    <cs:effectRef idx="0"/>
+    <cs:fontRef idx="minor">
+      <a:schemeClr val="tx1"/>
+    </cs:fontRef>
+    <cs:spPr>
+      <a:ln w="9525" cap="flat" cmpd="sng" algn="ctr">
+        <a:solidFill>
+          <a:schemeClr val="tx1">
+            <a:lumMod val="65000"/>
+            <a:lumOff val="35000"/>
+          </a:schemeClr>
+        </a:solidFill>
+        <a:round/>
+      </a:ln>
+    </cs:spPr>
+  </cs:errorBar>
+  <cs:floor>
+    <cs:lnRef idx="0"/>
+    <cs:fillRef idx="0"/>
+    <cs:effectRef idx="0"/>
+    <cs:fontRef idx="minor">
+      <a:schemeClr val="tx1"/>
+    </cs:fontRef>
+    <cs:spPr>
+      <a:noFill/>
+      <a:ln>
+        <a:noFill/>
+      </a:ln>
+    </cs:spPr>
+  </cs:floor>
+  <cs:gridlineMajor>
+    <cs:lnRef idx="0"/>
+    <cs:fillRef idx="0"/>
+    <cs:effectRef idx="0"/>
+    <cs:fontRef idx="minor">
+      <a:schemeClr val="tx1"/>
+    </cs:fontRef>
+    <cs:spPr>
+      <a:ln w="9525" cap="flat" cmpd="sng" algn="ctr">
+        <a:solidFill>
+          <a:schemeClr val="tx1">
+            <a:lumMod val="15000"/>
+            <a:lumOff val="85000"/>
+          </a:schemeClr>
+        </a:solidFill>
+        <a:round/>
+      </a:ln>
+    </cs:spPr>
+  </cs:gridlineMajor>
+  <cs:gridlineMinor>
+    <cs:lnRef idx="0"/>
+    <cs:fillRef idx="0"/>
+    <cs:effectRef idx="0"/>
+    <cs:fontRef idx="minor">
+      <a:schemeClr val="tx1"/>
+    </cs:fontRef>
+    <cs:spPr>
+      <a:ln w="9525" cap="flat" cmpd="sng" algn="ctr">
+        <a:solidFill>
+          <a:schemeClr val="tx1">
+            <a:lumMod val="5000"/>
+            <a:lumOff val="95000"/>
+          </a:schemeClr>
+        </a:solidFill>
+        <a:round/>
+      </a:ln>
+    </cs:spPr>
+  </cs:gridlineMinor>
+  <cs:hiLoLine>
+    <cs:lnRef idx="0"/>
+    <cs:fillRef idx="0"/>
+    <cs:effectRef idx="0"/>
+    <cs:fontRef idx="minor">
+      <a:schemeClr val="tx1"/>
+    </cs:fontRef>
+    <cs:spPr>
+      <a:ln w="9525" cap="flat" cmpd="sng" algn="ctr">
+        <a:solidFill>
+          <a:schemeClr val="tx1">
+            <a:lumMod val="75000"/>
+            <a:lumOff val="25000"/>
+          </a:schemeClr>
+        </a:solidFill>
+        <a:round/>
+      </a:ln>
+    </cs:spPr>
+  </cs:hiLoLine>
+  <cs:leaderLine>
+    <cs:lnRef idx="0"/>
+    <cs:fillRef idx="0"/>
+    <cs:effectRef idx="0"/>
+    <cs:fontRef idx="minor">
+      <a:schemeClr val="tx1"/>
+    </cs:fontRef>
+    <cs:spPr>
+      <a:ln w="9525" cap="flat" cmpd="sng" algn="ctr">
+        <a:solidFill>
+          <a:schemeClr val="tx1">
+            <a:lumMod val="35000"/>
+            <a:lumOff val="65000"/>
+          </a:schemeClr>
+        </a:solidFill>
+        <a:round/>
+      </a:ln>
+    </cs:spPr>
+  </cs:leaderLine>
+  <cs:legend>
+    <cs:lnRef idx="0"/>
+    <cs:fillRef idx="0"/>
+    <cs:effectRef idx="0"/>
+    <cs:fontRef idx="minor">
+      <a:schemeClr val="tx1">
+        <a:lumMod val="65000"/>
+        <a:lumOff val="35000"/>
+      </a:schemeClr>
+    </cs:fontRef>
+    <cs:defRPr sz="900" kern="1200"/>
+  </cs:legend>
+  <cs:plotArea mods="allowNoFillOverride allowNoLineOverride">
+    <cs:lnRef idx="0"/>
+    <cs:fillRef idx="0"/>
+    <cs:effectRef idx="0"/>
+    <cs:fontRef idx="minor">
+      <a:schemeClr val="tx1"/>
+    </cs:fontRef>
+  </cs:plotArea>
+  <cs:plotArea3D mods="allowNoFillOverride allowNoLineOverride">
+    <cs:lnRef idx="0"/>
+    <cs:fillRef idx="0"/>
+    <cs:effectRef idx="0"/>
+    <cs:fontRef idx="minor">
+      <a:schemeClr val="tx1"/>
+    </cs:fontRef>
+  </cs:plotArea3D>
+  <cs:seriesAxis>
+    <cs:lnRef idx="0"/>
+    <cs:fillRef idx="0"/>
+    <cs:effectRef idx="0"/>
+    <cs:fontRef idx="minor">
+      <a:schemeClr val="tx1">
+        <a:lumMod val="65000"/>
+        <a:lumOff val="35000"/>
+      </a:schemeClr>
+    </cs:fontRef>
+    <cs:defRPr sz="900" kern="1200"/>
+  </cs:seriesAxis>
+  <cs:seriesLine>
+    <cs:lnRef idx="0"/>
+    <cs:fillRef idx="0"/>
+    <cs:effectRef idx="0"/>
+    <cs:fontRef idx="minor">
+      <a:schemeClr val="tx1"/>
+    </cs:fontRef>
+    <cs:spPr>
+      <a:ln w="9525" cap="flat" cmpd="sng" algn="ctr">
+        <a:solidFill>
+          <a:schemeClr val="tx1">
+            <a:lumMod val="35000"/>
+            <a:lumOff val="65000"/>
+          </a:schemeClr>
+        </a:solidFill>
+        <a:round/>
+      </a:ln>
+    </cs:spPr>
+  </cs:seriesLine>
+  <cs:title>
+    <cs:lnRef idx="0"/>
+    <cs:fillRef idx="0"/>
+    <cs:effectRef idx="0"/>
+    <cs:fontRef idx="minor">
+      <a:schemeClr val="tx1">
+        <a:lumMod val="65000"/>
+        <a:lumOff val="35000"/>
+      </a:schemeClr>
+    </cs:fontRef>
+    <cs:defRPr sz="1400" b="0" kern="1200" spc="0" baseline="0"/>
+  </cs:title>
+  <cs:trendline>
+    <cs:lnRef idx="0">
+      <cs:styleClr val="auto"/>
+    </cs:lnRef>
+    <cs:fillRef idx="0"/>
+    <cs:effectRef idx="0"/>
+    <cs:fontRef idx="minor">
+      <a:schemeClr val="tx1"/>
+    </cs:fontRef>
+    <cs:spPr>
+      <a:ln w="19050" cap="rnd">
+        <a:solidFill>
+          <a:schemeClr val="phClr"/>
+        </a:solidFill>
+        <a:prstDash val="sysDot"/>
+      </a:ln>
+    </cs:spPr>
+  </cs:trendline>
+  <cs:trendlineLabel>
+    <cs:lnRef idx="0"/>
+    <cs:fillRef idx="0"/>
+    <cs:effectRef idx="0"/>
+    <cs:fontRef idx="minor">
+      <a:schemeClr val="tx1">
+        <a:lumMod val="65000"/>
+        <a:lumOff val="35000"/>
+      </a:schemeClr>
+    </cs:fontRef>
+    <cs:defRPr sz="900" kern="1200"/>
+  </cs:trendlineLabel>
+  <cs:upBar>
+    <cs:lnRef idx="0"/>
+    <cs:fillRef idx="0"/>
+    <cs:effectRef idx="0"/>
+    <cs:fontRef idx="minor">
+      <a:schemeClr val="dk1"/>
+    </cs:fontRef>
+    <cs:spPr>
+      <a:solidFill>
+        <a:schemeClr val="lt1"/>
+      </a:solidFill>
+      <a:ln w="9525">
+        <a:solidFill>
+          <a:schemeClr val="tx1">
+            <a:lumMod val="15000"/>
+            <a:lumOff val="85000"/>
+          </a:schemeClr>
+        </a:solidFill>
+      </a:ln>
+    </cs:spPr>
+  </cs:upBar>
+  <cs:valueAxis>
+    <cs:lnRef idx="0"/>
+    <cs:fillRef idx="0"/>
+    <cs:effectRef idx="0"/>
+    <cs:fontRef idx="minor">
+      <a:schemeClr val="tx1">
+        <a:lumMod val="65000"/>
+        <a:lumOff val="35000"/>
+      </a:schemeClr>
+    </cs:fontRef>
+    <cs:defRPr sz="900" kern="1200"/>
+  </cs:valueAxis>
+  <cs:wall>
+    <cs:lnRef idx="0"/>
+    <cs:fillRef idx="0"/>
+    <cs:effectRef idx="0"/>
+    <cs:fontRef idx="minor">
+      <a:schemeClr val="tx1"/>
+    </cs:fontRef>
+    <cs:spPr>
+      <a:noFill/>
+      <a:ln>
+        <a:noFill/>
+      </a:ln>
+    </cs:spPr>
+  </cs:wall>
+</cs:chartStyle>
+</file>
+
 <file path=ppt/slideLayouts/slideLayout1.xml><?xml version="1.0" encoding="utf-8"?>
 <p:sldLayout xmlns:a="http://schemas.openxmlformats.org/drawingml/2006/main" xmlns:r="http://schemas.openxmlformats.org/officeDocument/2006/relationships" xmlns:p="http://schemas.openxmlformats.org/presentationml/2006/main" type="title" preserve="1">
   <p:cSld name="Title Slide">
@@ -265,7 +1938,7 @@
           <a:p>
             <a:fld id="{A1271B54-4FE3-4F00-A9A1-C0715B607BDA}" type="datetimeFigureOut">
               <a:rPr lang="en-US" smtClean="0"/>
-              <a:t>11/26/2020</a:t>
+              <a:t>11/29/2020</a:t>
             </a:fld>
             <a:endParaRPr lang="en-US"/>
           </a:p>
@@ -463,7 +2136,7 @@
           <a:p>
             <a:fld id="{A1271B54-4FE3-4F00-A9A1-C0715B607BDA}" type="datetimeFigureOut">
               <a:rPr lang="en-US" smtClean="0"/>
-              <a:t>11/26/2020</a:t>
+              <a:t>11/29/2020</a:t>
             </a:fld>
             <a:endParaRPr lang="en-US"/>
           </a:p>
@@ -671,7 +2344,7 @@
           <a:p>
             <a:fld id="{A1271B54-4FE3-4F00-A9A1-C0715B607BDA}" type="datetimeFigureOut">
               <a:rPr lang="en-US" smtClean="0"/>
-              <a:t>11/26/2020</a:t>
+              <a:t>11/29/2020</a:t>
             </a:fld>
             <a:endParaRPr lang="en-US"/>
           </a:p>
@@ -869,7 +2542,7 @@
           <a:p>
             <a:fld id="{A1271B54-4FE3-4F00-A9A1-C0715B607BDA}" type="datetimeFigureOut">
               <a:rPr lang="en-US" smtClean="0"/>
-              <a:t>11/26/2020</a:t>
+              <a:t>11/29/2020</a:t>
             </a:fld>
             <a:endParaRPr lang="en-US"/>
           </a:p>
@@ -1144,7 +2817,7 @@
           <a:p>
             <a:fld id="{A1271B54-4FE3-4F00-A9A1-C0715B607BDA}" type="datetimeFigureOut">
               <a:rPr lang="en-US" smtClean="0"/>
-              <a:t>11/26/2020</a:t>
+              <a:t>11/29/2020</a:t>
             </a:fld>
             <a:endParaRPr lang="en-US"/>
           </a:p>
@@ -1409,7 +3082,7 @@
           <a:p>
             <a:fld id="{A1271B54-4FE3-4F00-A9A1-C0715B607BDA}" type="datetimeFigureOut">
               <a:rPr lang="en-US" smtClean="0"/>
-              <a:t>11/26/2020</a:t>
+              <a:t>11/29/2020</a:t>
             </a:fld>
             <a:endParaRPr lang="en-US"/>
           </a:p>
@@ -1821,7 +3494,7 @@
           <a:p>
             <a:fld id="{A1271B54-4FE3-4F00-A9A1-C0715B607BDA}" type="datetimeFigureOut">
               <a:rPr lang="en-US" smtClean="0"/>
-              <a:t>11/26/2020</a:t>
+              <a:t>11/29/2020</a:t>
             </a:fld>
             <a:endParaRPr lang="en-US"/>
           </a:p>
@@ -1962,7 +3635,7 @@
           <a:p>
             <a:fld id="{A1271B54-4FE3-4F00-A9A1-C0715B607BDA}" type="datetimeFigureOut">
               <a:rPr lang="en-US" smtClean="0"/>
-              <a:t>11/26/2020</a:t>
+              <a:t>11/29/2020</a:t>
             </a:fld>
             <a:endParaRPr lang="en-US"/>
           </a:p>
@@ -2075,7 +3748,7 @@
           <a:p>
             <a:fld id="{A1271B54-4FE3-4F00-A9A1-C0715B607BDA}" type="datetimeFigureOut">
               <a:rPr lang="en-US" smtClean="0"/>
-              <a:t>11/26/2020</a:t>
+              <a:t>11/29/2020</a:t>
             </a:fld>
             <a:endParaRPr lang="en-US"/>
           </a:p>
@@ -2386,7 +4059,7 @@
           <a:p>
             <a:fld id="{A1271B54-4FE3-4F00-A9A1-C0715B607BDA}" type="datetimeFigureOut">
               <a:rPr lang="en-US" smtClean="0"/>
-              <a:t>11/26/2020</a:t>
+              <a:t>11/29/2020</a:t>
             </a:fld>
             <a:endParaRPr lang="en-US"/>
           </a:p>
@@ -2674,7 +4347,7 @@
           <a:p>
             <a:fld id="{A1271B54-4FE3-4F00-A9A1-C0715B607BDA}" type="datetimeFigureOut">
               <a:rPr lang="en-US" smtClean="0"/>
-              <a:t>11/26/2020</a:t>
+              <a:t>11/29/2020</a:t>
             </a:fld>
             <a:endParaRPr lang="en-US"/>
           </a:p>
@@ -2915,7 +4588,7 @@
           <a:p>
             <a:fld id="{A1271B54-4FE3-4F00-A9A1-C0715B607BDA}" type="datetimeFigureOut">
               <a:rPr lang="en-US" smtClean="0"/>
-              <a:t>11/26/2020</a:t>
+              <a:t>11/29/2020</a:t>
             </a:fld>
             <a:endParaRPr lang="en-US"/>
           </a:p>
@@ -5103,6 +6776,96 @@
 </file>
 
 <file path=ppt/slides/slide7.xml><?xml version="1.0" encoding="utf-8"?>
+<p:sld xmlns:a="http://schemas.openxmlformats.org/drawingml/2006/main" xmlns:r="http://schemas.openxmlformats.org/officeDocument/2006/relationships" xmlns:p="http://schemas.openxmlformats.org/presentationml/2006/main">
+  <p:cSld>
+    <p:spTree>
+      <p:nvGrpSpPr>
+        <p:cNvPr id="1" name=""/>
+        <p:cNvGrpSpPr/>
+        <p:nvPr/>
+      </p:nvGrpSpPr>
+      <p:grpSpPr>
+        <a:xfrm>
+          <a:off x="0" y="0"/>
+          <a:ext cx="0" cy="0"/>
+          <a:chOff x="0" y="0"/>
+          <a:chExt cx="0" cy="0"/>
+        </a:xfrm>
+      </p:grpSpPr>
+      <p:graphicFrame>
+        <p:nvGraphicFramePr>
+          <p:cNvPr id="3" name="Chart 2">
+            <a:extLst>
+              <a:ext uri="{FF2B5EF4-FFF2-40B4-BE49-F238E27FC236}">
+                <a16:creationId xmlns:a16="http://schemas.microsoft.com/office/drawing/2014/main" id="{EADB82B3-D7B3-46DD-99C5-60BF663677C2}"/>
+              </a:ext>
+            </a:extLst>
+          </p:cNvPr>
+          <p:cNvGraphicFramePr>
+            <a:graphicFrameLocks/>
+          </p:cNvGraphicFramePr>
+          <p:nvPr>
+            <p:extLst>
+              <p:ext uri="{D42A27DB-BD31-4B8C-83A1-F6EECF244321}">
+                <p14:modId xmlns:p14="http://schemas.microsoft.com/office/powerpoint/2010/main" val="983766094"/>
+              </p:ext>
+            </p:extLst>
+          </p:nvPr>
+        </p:nvGraphicFramePr>
+        <p:xfrm>
+          <a:off x="5773271" y="2605088"/>
+          <a:ext cx="6418729" cy="3957078"/>
+        </p:xfrm>
+        <a:graphic>
+          <a:graphicData uri="http://schemas.openxmlformats.org/drawingml/2006/chart">
+            <c:chart xmlns:c="http://schemas.openxmlformats.org/drawingml/2006/chart" xmlns:r="http://schemas.openxmlformats.org/officeDocument/2006/relationships" r:id="rId2"/>
+          </a:graphicData>
+        </a:graphic>
+      </p:graphicFrame>
+      <p:pic>
+        <p:nvPicPr>
+          <p:cNvPr id="4" name="Picture 3">
+            <a:extLst>
+              <a:ext uri="{FF2B5EF4-FFF2-40B4-BE49-F238E27FC236}">
+                <a16:creationId xmlns:a16="http://schemas.microsoft.com/office/drawing/2014/main" id="{5F6A9F25-C009-4177-A021-FFD2BAF4A280}"/>
+              </a:ext>
+            </a:extLst>
+          </p:cNvPr>
+          <p:cNvPicPr>
+            <a:picLocks noChangeAspect="1"/>
+          </p:cNvPicPr>
+          <p:nvPr/>
+        </p:nvPicPr>
+        <p:blipFill>
+          <a:blip r:embed="rId3"/>
+          <a:stretch>
+            <a:fillRect/>
+          </a:stretch>
+        </p:blipFill>
+        <p:spPr>
+          <a:xfrm>
+            <a:off x="0" y="0"/>
+            <a:ext cx="5934635" cy="3638153"/>
+          </a:xfrm>
+          <a:prstGeom prst="rect">
+            <a:avLst/>
+          </a:prstGeom>
+        </p:spPr>
+      </p:pic>
+    </p:spTree>
+    <p:extLst>
+      <p:ext uri="{BB962C8B-B14F-4D97-AF65-F5344CB8AC3E}">
+        <p14:creationId xmlns:p14="http://schemas.microsoft.com/office/powerpoint/2010/main" val="865496725"/>
+      </p:ext>
+    </p:extLst>
+  </p:cSld>
+  <p:clrMapOvr>
+    <a:masterClrMapping/>
+  </p:clrMapOvr>
+</p:sld>
+</file>
+
+<file path=ppt/slides/slide8.xml><?xml version="1.0" encoding="utf-8"?>
 <p:sld xmlns:a="http://schemas.openxmlformats.org/drawingml/2006/main" xmlns:r="http://schemas.openxmlformats.org/officeDocument/2006/relationships" xmlns:p="http://schemas.openxmlformats.org/presentationml/2006/main">
   <p:cSld>
     <p:spTree>

</xml_diff>